<commit_message>
ajout diapo maj après correction
</commit_message>
<xml_diff>
--- a/Diaporama_Haldan.pptx
+++ b/Diaporama_Haldan.pptx
@@ -218,7 +218,7 @@
           <a:p>
             <a:fld id="{2A66B065-9387-4DBD-8600-802E541FAA81}" type="datetimeFigureOut">
               <a:rPr lang="fr-FR" smtClean="0"/>
-              <a:t>23/10/2024</a:t>
+              <a:t>14/11/2024</a:t>
             </a:fld>
             <a:endParaRPr lang="fr-FR"/>
           </a:p>
@@ -887,7 +887,7 @@
           <a:p>
             <a:fld id="{3E0B693A-D2B8-4B57-85B9-014129D5826F}" type="datetime1">
               <a:rPr lang="fr-FR" smtClean="0"/>
-              <a:t>23/10/2024</a:t>
+              <a:t>14/11/2024</a:t>
             </a:fld>
             <a:endParaRPr lang="fr-FR"/>
           </a:p>
@@ -1085,7 +1085,7 @@
           <a:p>
             <a:fld id="{F568C7D9-F8E9-4705-A480-33967B4A0D26}" type="datetime1">
               <a:rPr lang="fr-FR" smtClean="0"/>
-              <a:t>23/10/2024</a:t>
+              <a:t>14/11/2024</a:t>
             </a:fld>
             <a:endParaRPr lang="fr-FR"/>
           </a:p>
@@ -1293,7 +1293,7 @@
           <a:p>
             <a:fld id="{C1EC2290-3AE2-4E71-A7F4-18D587792CA9}" type="datetime1">
               <a:rPr lang="fr-FR" smtClean="0"/>
-              <a:t>23/10/2024</a:t>
+              <a:t>14/11/2024</a:t>
             </a:fld>
             <a:endParaRPr lang="fr-FR"/>
           </a:p>
@@ -1491,7 +1491,7 @@
           <a:p>
             <a:fld id="{766EBF72-7517-4461-B354-4191685EDDC8}" type="datetime1">
               <a:rPr lang="fr-FR" smtClean="0"/>
-              <a:t>23/10/2024</a:t>
+              <a:t>14/11/2024</a:t>
             </a:fld>
             <a:endParaRPr lang="fr-FR"/>
           </a:p>
@@ -1766,7 +1766,7 @@
           <a:p>
             <a:fld id="{094E9DE1-7995-43F9-991D-A5A93E0478F0}" type="datetime1">
               <a:rPr lang="fr-FR" smtClean="0"/>
-              <a:t>23/10/2024</a:t>
+              <a:t>14/11/2024</a:t>
             </a:fld>
             <a:endParaRPr lang="fr-FR"/>
           </a:p>
@@ -2031,7 +2031,7 @@
           <a:p>
             <a:fld id="{053B08B5-B0C1-46E8-BDD3-700655DE7CC5}" type="datetime1">
               <a:rPr lang="fr-FR" smtClean="0"/>
-              <a:t>23/10/2024</a:t>
+              <a:t>14/11/2024</a:t>
             </a:fld>
             <a:endParaRPr lang="fr-FR"/>
           </a:p>
@@ -2443,7 +2443,7 @@
           <a:p>
             <a:fld id="{3C492FBF-EA20-4B8A-AB3E-A6E8D0CC354F}" type="datetime1">
               <a:rPr lang="fr-FR" smtClean="0"/>
-              <a:t>23/10/2024</a:t>
+              <a:t>14/11/2024</a:t>
             </a:fld>
             <a:endParaRPr lang="fr-FR"/>
           </a:p>
@@ -2584,7 +2584,7 @@
           <a:p>
             <a:fld id="{9E53FCEB-A186-42D3-9A43-6D06E4CD287B}" type="datetime1">
               <a:rPr lang="fr-FR" smtClean="0"/>
-              <a:t>23/10/2024</a:t>
+              <a:t>14/11/2024</a:t>
             </a:fld>
             <a:endParaRPr lang="fr-FR"/>
           </a:p>
@@ -2697,7 +2697,7 @@
           <a:p>
             <a:fld id="{C170BFAA-2AA9-4C82-A857-08FE27EFAC87}" type="datetime1">
               <a:rPr lang="fr-FR" smtClean="0"/>
-              <a:t>23/10/2024</a:t>
+              <a:t>14/11/2024</a:t>
             </a:fld>
             <a:endParaRPr lang="fr-FR"/>
           </a:p>
@@ -3008,7 +3008,7 @@
           <a:p>
             <a:fld id="{45FA2CA3-C397-4A14-A3DB-ECD260EB106D}" type="datetime1">
               <a:rPr lang="fr-FR" smtClean="0"/>
-              <a:t>23/10/2024</a:t>
+              <a:t>14/11/2024</a:t>
             </a:fld>
             <a:endParaRPr lang="fr-FR"/>
           </a:p>
@@ -3296,7 +3296,7 @@
           <a:p>
             <a:fld id="{A749108A-B06E-447E-A193-61B77A5828ED}" type="datetime1">
               <a:rPr lang="fr-FR" smtClean="0"/>
-              <a:t>23/10/2024</a:t>
+              <a:t>14/11/2024</a:t>
             </a:fld>
             <a:endParaRPr lang="fr-FR"/>
           </a:p>
@@ -3537,7 +3537,7 @@
           <a:p>
             <a:fld id="{E44FC4A1-A753-46C7-AC70-0CBDD0D3C809}" type="datetime1">
               <a:rPr lang="fr-FR" smtClean="0"/>
-              <a:t>23/10/2024</a:t>
+              <a:t>14/11/2024</a:t>
             </a:fld>
             <a:endParaRPr lang="fr-FR"/>
           </a:p>
@@ -4552,8 +4552,8 @@
         </p:nvSpPr>
         <p:spPr>
           <a:xfrm>
-            <a:off x="838200" y="1790650"/>
-            <a:ext cx="10515600" cy="1006066"/>
+            <a:off x="501316" y="4082712"/>
+            <a:ext cx="10515600" cy="555523"/>
           </a:xfrm>
           <a:prstGeom prst="rect">
             <a:avLst/>
@@ -4766,10 +4766,10 @@
           </p:nvPr>
         </p:nvPicPr>
         <p:blipFill>
-          <a:blip r:embed="rId12">
+          <a:blip r:embed="rId14">
             <a:extLst>
               <a:ext uri="{96DAC541-7B7A-43D3-8B79-37D633B846F1}">
-                <asvg:svgBlip xmlns:asvg="http://schemas.microsoft.com/office/drawing/2016/SVG/main" r:embed="rId13"/>
+                <asvg:svgBlip xmlns:asvg="http://schemas.microsoft.com/office/drawing/2016/SVG/main" r:embed="rId15"/>
               </a:ext>
             </a:extLst>
           </a:blip>
@@ -4779,8 +4779,8 @@
         </p:blipFill>
         <p:spPr>
           <a:xfrm>
-            <a:off x="3126658" y="2180866"/>
-            <a:ext cx="1320597" cy="1320597"/>
+            <a:off x="2948862" y="4438817"/>
+            <a:ext cx="463737" cy="463737"/>
           </a:xfrm>
           <a:prstGeom prst="rect">
             <a:avLst/>
@@ -4807,8 +4807,8 @@
         </p:nvSpPr>
         <p:spPr>
           <a:xfrm>
-            <a:off x="1184787" y="2230439"/>
-            <a:ext cx="9613490" cy="3602035"/>
+            <a:off x="838200" y="4155444"/>
+            <a:ext cx="9613490" cy="1981036"/>
           </a:xfrm>
           <a:prstGeom prst="rect">
             <a:avLst/>
@@ -5005,24 +5005,6 @@
           </a:p>
           <a:p>
             <a:pPr algn="just"/>
-            <a:endParaRPr lang="fr-FR" sz="1800" kern="100" dirty="0">
-              <a:effectLst/>
-              <a:latin typeface="Times New Roman" panose="02020603050405020304" pitchFamily="18" charset="0"/>
-              <a:ea typeface="Aptos" panose="020B0004020202020204" pitchFamily="34" charset="0"/>
-              <a:cs typeface="Times New Roman" panose="02020603050405020304" pitchFamily="18" charset="0"/>
-            </a:endParaRPr>
-          </a:p>
-          <a:p>
-            <a:pPr algn="just"/>
-            <a:endParaRPr lang="fr-FR" sz="1800" kern="100" dirty="0">
-              <a:effectLst/>
-              <a:latin typeface="Times New Roman" panose="02020603050405020304" pitchFamily="18" charset="0"/>
-              <a:ea typeface="Aptos" panose="020B0004020202020204" pitchFamily="34" charset="0"/>
-              <a:cs typeface="Times New Roman" panose="02020603050405020304" pitchFamily="18" charset="0"/>
-            </a:endParaRPr>
-          </a:p>
-          <a:p>
-            <a:pPr algn="just"/>
             <a:r>
               <a:rPr lang="fr-FR" sz="1800" kern="100" dirty="0">
                 <a:effectLst/>
@@ -5032,25 +5014,6 @@
               </a:rPr>
               <a:t>Classement des utilisateurs en fonction des livres ajoutés</a:t>
             </a:r>
-          </a:p>
-          <a:p>
-            <a:pPr algn="just"/>
-            <a:endParaRPr lang="fr-FR" sz="1800" kern="100" dirty="0">
-              <a:latin typeface="Times New Roman" panose="02020603050405020304" pitchFamily="18" charset="0"/>
-              <a:ea typeface="Aptos" panose="020B0004020202020204" pitchFamily="34" charset="0"/>
-              <a:cs typeface="Times New Roman" panose="02020603050405020304" pitchFamily="18" charset="0"/>
-            </a:endParaRPr>
-          </a:p>
-          <a:p>
-            <a:pPr algn="just"/>
-            <a:endParaRPr lang="fr-FR" sz="1800" kern="100" dirty="0">
-              <a:latin typeface="Times New Roman" panose="02020603050405020304" pitchFamily="18" charset="0"/>
-              <a:ea typeface="Aptos" panose="020B0004020202020204" pitchFamily="34" charset="0"/>
-              <a:cs typeface="Times New Roman" panose="02020603050405020304" pitchFamily="18" charset="0"/>
-            </a:endParaRPr>
-          </a:p>
-          <a:p>
-            <a:pPr algn="just"/>
             <a:endParaRPr lang="fr-FR" sz="1800" kern="100" dirty="0">
               <a:latin typeface="Times New Roman" panose="02020603050405020304" pitchFamily="18" charset="0"/>
               <a:ea typeface="Aptos" panose="020B0004020202020204" pitchFamily="34" charset="0"/>
@@ -5106,10 +5069,10 @@
           </p:nvPr>
         </p:nvPicPr>
         <p:blipFill>
-          <a:blip r:embed="rId14">
+          <a:blip r:embed="rId16">
             <a:extLst>
               <a:ext uri="{96DAC541-7B7A-43D3-8B79-37D633B846F1}">
-                <asvg:svgBlip xmlns:asvg="http://schemas.microsoft.com/office/drawing/2016/SVG/main" r:embed="rId15"/>
+                <asvg:svgBlip xmlns:asvg="http://schemas.microsoft.com/office/drawing/2016/SVG/main" r:embed="rId17"/>
               </a:ext>
             </a:extLst>
           </a:blip>
@@ -5119,8 +5082,8 @@
         </p:blipFill>
         <p:spPr>
           <a:xfrm>
-            <a:off x="6940984" y="3242737"/>
-            <a:ext cx="1174315" cy="1174315"/>
+            <a:off x="6479202" y="4725012"/>
+            <a:ext cx="565236" cy="565236"/>
           </a:xfrm>
           <a:prstGeom prst="rect">
             <a:avLst/>
@@ -5146,10 +5109,10 @@
           </p:nvPr>
         </p:nvPicPr>
         <p:blipFill>
-          <a:blip r:embed="rId16">
+          <a:blip r:embed="rId18">
             <a:extLst>
               <a:ext uri="{96DAC541-7B7A-43D3-8B79-37D633B846F1}">
-                <asvg:svgBlip xmlns:asvg="http://schemas.microsoft.com/office/drawing/2016/SVG/main" r:embed="rId17"/>
+                <asvg:svgBlip xmlns:asvg="http://schemas.microsoft.com/office/drawing/2016/SVG/main" r:embed="rId19"/>
               </a:ext>
             </a:extLst>
           </a:blip>
@@ -5159,14 +5122,498 @@
         </p:blipFill>
         <p:spPr>
           <a:xfrm>
-            <a:off x="10439400" y="4808996"/>
-            <a:ext cx="914400" cy="914400"/>
+            <a:off x="10233051" y="5145962"/>
+            <a:ext cx="555523" cy="555523"/>
           </a:xfrm>
           <a:prstGeom prst="rect">
             <a:avLst/>
           </a:prstGeom>
         </p:spPr>
       </p:pic>
+      <p:sp>
+        <p:nvSpPr>
+          <p:cNvPr id="4" name="Espace réservé du contenu 2">
+            <a:extLst>
+              <a:ext uri="{FF2B5EF4-FFF2-40B4-BE49-F238E27FC236}">
+                <a16:creationId xmlns:a16="http://schemas.microsoft.com/office/drawing/2014/main" id="{D3CF44CF-4EBE-7914-8390-2711D9FCEFAC}"/>
+              </a:ext>
+            </a:extLst>
+          </p:cNvPr>
+          <p:cNvSpPr txBox="1">
+            <a:spLocks/>
+          </p:cNvSpPr>
+          <p:nvPr>
+            <p:custDataLst>
+              <p:tags r:id="rId11"/>
+            </p:custDataLst>
+          </p:nvPr>
+        </p:nvSpPr>
+        <p:spPr>
+          <a:xfrm>
+            <a:off x="501316" y="1369787"/>
+            <a:ext cx="10515600" cy="555523"/>
+          </a:xfrm>
+          <a:prstGeom prst="rect">
+            <a:avLst/>
+          </a:prstGeom>
+        </p:spPr>
+        <p:txBody>
+          <a:bodyPr vert="horz" lIns="91440" tIns="45720" rIns="91440" bIns="45720" rtlCol="0">
+            <a:normAutofit/>
+          </a:bodyPr>
+          <a:lstStyle>
+            <a:lvl1pPr marL="228600" indent="-228600" algn="l" defTabSz="914400" rtl="0" eaLnBrk="1" latinLnBrk="0" hangingPunct="1">
+              <a:lnSpc>
+                <a:spcPct val="90000"/>
+              </a:lnSpc>
+              <a:spcBef>
+                <a:spcPts val="1000"/>
+              </a:spcBef>
+              <a:buFont typeface="Arial" panose="020B0604020202020204" pitchFamily="34" charset="0"/>
+              <a:buChar char="•"/>
+              <a:defRPr sz="2800" kern="1200">
+                <a:solidFill>
+                  <a:schemeClr val="tx1"/>
+                </a:solidFill>
+                <a:latin typeface="+mn-lt"/>
+                <a:ea typeface="+mn-ea"/>
+                <a:cs typeface="+mn-cs"/>
+              </a:defRPr>
+            </a:lvl1pPr>
+            <a:lvl2pPr marL="685800" indent="-228600" algn="l" defTabSz="914400" rtl="0" eaLnBrk="1" latinLnBrk="0" hangingPunct="1">
+              <a:lnSpc>
+                <a:spcPct val="90000"/>
+              </a:lnSpc>
+              <a:spcBef>
+                <a:spcPts val="500"/>
+              </a:spcBef>
+              <a:buFont typeface="Arial" panose="020B0604020202020204" pitchFamily="34" charset="0"/>
+              <a:buChar char="•"/>
+              <a:defRPr sz="2400" kern="1200">
+                <a:solidFill>
+                  <a:schemeClr val="tx1"/>
+                </a:solidFill>
+                <a:latin typeface="+mn-lt"/>
+                <a:ea typeface="+mn-ea"/>
+                <a:cs typeface="+mn-cs"/>
+              </a:defRPr>
+            </a:lvl2pPr>
+            <a:lvl3pPr marL="1143000" indent="-228600" algn="l" defTabSz="914400" rtl="0" eaLnBrk="1" latinLnBrk="0" hangingPunct="1">
+              <a:lnSpc>
+                <a:spcPct val="90000"/>
+              </a:lnSpc>
+              <a:spcBef>
+                <a:spcPts val="500"/>
+              </a:spcBef>
+              <a:buFont typeface="Arial" panose="020B0604020202020204" pitchFamily="34" charset="0"/>
+              <a:buChar char="•"/>
+              <a:defRPr sz="2000" kern="1200">
+                <a:solidFill>
+                  <a:schemeClr val="tx1"/>
+                </a:solidFill>
+                <a:latin typeface="+mn-lt"/>
+                <a:ea typeface="+mn-ea"/>
+                <a:cs typeface="+mn-cs"/>
+              </a:defRPr>
+            </a:lvl3pPr>
+            <a:lvl4pPr marL="1600200" indent="-228600" algn="l" defTabSz="914400" rtl="0" eaLnBrk="1" latinLnBrk="0" hangingPunct="1">
+              <a:lnSpc>
+                <a:spcPct val="90000"/>
+              </a:lnSpc>
+              <a:spcBef>
+                <a:spcPts val="500"/>
+              </a:spcBef>
+              <a:buFont typeface="Arial" panose="020B0604020202020204" pitchFamily="34" charset="0"/>
+              <a:buChar char="•"/>
+              <a:defRPr sz="1800" kern="1200">
+                <a:solidFill>
+                  <a:schemeClr val="tx1"/>
+                </a:solidFill>
+                <a:latin typeface="+mn-lt"/>
+                <a:ea typeface="+mn-ea"/>
+                <a:cs typeface="+mn-cs"/>
+              </a:defRPr>
+            </a:lvl4pPr>
+            <a:lvl5pPr marL="2057400" indent="-228600" algn="l" defTabSz="914400" rtl="0" eaLnBrk="1" latinLnBrk="0" hangingPunct="1">
+              <a:lnSpc>
+                <a:spcPct val="90000"/>
+              </a:lnSpc>
+              <a:spcBef>
+                <a:spcPts val="500"/>
+              </a:spcBef>
+              <a:buFont typeface="Arial" panose="020B0604020202020204" pitchFamily="34" charset="0"/>
+              <a:buChar char="•"/>
+              <a:defRPr sz="1800" kern="1200">
+                <a:solidFill>
+                  <a:schemeClr val="tx1"/>
+                </a:solidFill>
+                <a:latin typeface="+mn-lt"/>
+                <a:ea typeface="+mn-ea"/>
+                <a:cs typeface="+mn-cs"/>
+              </a:defRPr>
+            </a:lvl5pPr>
+            <a:lvl6pPr marL="2514600" indent="-228600" algn="l" defTabSz="914400" rtl="0" eaLnBrk="1" latinLnBrk="0" hangingPunct="1">
+              <a:lnSpc>
+                <a:spcPct val="90000"/>
+              </a:lnSpc>
+              <a:spcBef>
+                <a:spcPts val="500"/>
+              </a:spcBef>
+              <a:buFont typeface="Arial" panose="020B0604020202020204" pitchFamily="34" charset="0"/>
+              <a:buChar char="•"/>
+              <a:defRPr sz="1800" kern="1200">
+                <a:solidFill>
+                  <a:schemeClr val="tx1"/>
+                </a:solidFill>
+                <a:latin typeface="+mn-lt"/>
+                <a:ea typeface="+mn-ea"/>
+                <a:cs typeface="+mn-cs"/>
+              </a:defRPr>
+            </a:lvl6pPr>
+            <a:lvl7pPr marL="2971800" indent="-228600" algn="l" defTabSz="914400" rtl="0" eaLnBrk="1" latinLnBrk="0" hangingPunct="1">
+              <a:lnSpc>
+                <a:spcPct val="90000"/>
+              </a:lnSpc>
+              <a:spcBef>
+                <a:spcPts val="500"/>
+              </a:spcBef>
+              <a:buFont typeface="Arial" panose="020B0604020202020204" pitchFamily="34" charset="0"/>
+              <a:buChar char="•"/>
+              <a:defRPr sz="1800" kern="1200">
+                <a:solidFill>
+                  <a:schemeClr val="tx1"/>
+                </a:solidFill>
+                <a:latin typeface="+mn-lt"/>
+                <a:ea typeface="+mn-ea"/>
+                <a:cs typeface="+mn-cs"/>
+              </a:defRPr>
+            </a:lvl7pPr>
+            <a:lvl8pPr marL="3429000" indent="-228600" algn="l" defTabSz="914400" rtl="0" eaLnBrk="1" latinLnBrk="0" hangingPunct="1">
+              <a:lnSpc>
+                <a:spcPct val="90000"/>
+              </a:lnSpc>
+              <a:spcBef>
+                <a:spcPts val="500"/>
+              </a:spcBef>
+              <a:buFont typeface="Arial" panose="020B0604020202020204" pitchFamily="34" charset="0"/>
+              <a:buChar char="•"/>
+              <a:defRPr sz="1800" kern="1200">
+                <a:solidFill>
+                  <a:schemeClr val="tx1"/>
+                </a:solidFill>
+                <a:latin typeface="+mn-lt"/>
+                <a:ea typeface="+mn-ea"/>
+                <a:cs typeface="+mn-cs"/>
+              </a:defRPr>
+            </a:lvl8pPr>
+            <a:lvl9pPr marL="3886200" indent="-228600" algn="l" defTabSz="914400" rtl="0" eaLnBrk="1" latinLnBrk="0" hangingPunct="1">
+              <a:lnSpc>
+                <a:spcPct val="90000"/>
+              </a:lnSpc>
+              <a:spcBef>
+                <a:spcPts val="500"/>
+              </a:spcBef>
+              <a:buFont typeface="Arial" panose="020B0604020202020204" pitchFamily="34" charset="0"/>
+              <a:buChar char="•"/>
+              <a:defRPr sz="1800" kern="1200">
+                <a:solidFill>
+                  <a:schemeClr val="tx1"/>
+                </a:solidFill>
+                <a:latin typeface="+mn-lt"/>
+                <a:ea typeface="+mn-ea"/>
+                <a:cs typeface="+mn-cs"/>
+              </a:defRPr>
+            </a:lvl9pPr>
+          </a:lstStyle>
+          <a:p>
+            <a:pPr marL="0" indent="0" algn="just">
+              <a:buNone/>
+            </a:pPr>
+            <a:r>
+              <a:rPr lang="fr-FR" sz="1800" dirty="0">
+                <a:latin typeface="Times New Roman" panose="02020603050405020304" pitchFamily="18" charset="0"/>
+                <a:cs typeface="Times New Roman" panose="02020603050405020304" pitchFamily="18" charset="0"/>
+              </a:rPr>
+              <a:t>Évolution du projet dans le futur :</a:t>
+            </a:r>
+            <a:endParaRPr lang="fr-FR" sz="1800" kern="100" dirty="0">
+              <a:effectLst/>
+              <a:latin typeface="Times New Roman" panose="02020603050405020304" pitchFamily="18" charset="0"/>
+              <a:ea typeface="Aptos" panose="020B0004020202020204" pitchFamily="34" charset="0"/>
+              <a:cs typeface="Times New Roman" panose="02020603050405020304" pitchFamily="18" charset="0"/>
+            </a:endParaRPr>
+          </a:p>
+        </p:txBody>
+      </p:sp>
+      <p:sp>
+        <p:nvSpPr>
+          <p:cNvPr id="7" name="Espace réservé du contenu 2">
+            <a:extLst>
+              <a:ext uri="{FF2B5EF4-FFF2-40B4-BE49-F238E27FC236}">
+                <a16:creationId xmlns:a16="http://schemas.microsoft.com/office/drawing/2014/main" id="{A8F6BA45-2DB8-53FF-7240-C3C04131486A}"/>
+              </a:ext>
+            </a:extLst>
+          </p:cNvPr>
+          <p:cNvSpPr txBox="1">
+            <a:spLocks/>
+          </p:cNvSpPr>
+          <p:nvPr>
+            <p:custDataLst>
+              <p:tags r:id="rId12"/>
+            </p:custDataLst>
+          </p:nvPr>
+        </p:nvSpPr>
+        <p:spPr>
+          <a:xfrm>
+            <a:off x="838200" y="1873472"/>
+            <a:ext cx="9613490" cy="1981036"/>
+          </a:xfrm>
+          <a:prstGeom prst="rect">
+            <a:avLst/>
+          </a:prstGeom>
+        </p:spPr>
+        <p:txBody>
+          <a:bodyPr vert="horz" lIns="91440" tIns="45720" rIns="91440" bIns="45720" rtlCol="0">
+            <a:normAutofit fontScale="92500" lnSpcReduction="10000"/>
+          </a:bodyPr>
+          <a:lstStyle>
+            <a:lvl1pPr marL="228600" indent="-228600" algn="l" defTabSz="914400" rtl="0" eaLnBrk="1" latinLnBrk="0" hangingPunct="1">
+              <a:lnSpc>
+                <a:spcPct val="90000"/>
+              </a:lnSpc>
+              <a:spcBef>
+                <a:spcPts val="1000"/>
+              </a:spcBef>
+              <a:buFont typeface="Arial" panose="020B0604020202020204" pitchFamily="34" charset="0"/>
+              <a:buChar char="•"/>
+              <a:defRPr sz="2800" kern="1200">
+                <a:solidFill>
+                  <a:schemeClr val="tx1"/>
+                </a:solidFill>
+                <a:latin typeface="+mn-lt"/>
+                <a:ea typeface="+mn-ea"/>
+                <a:cs typeface="+mn-cs"/>
+              </a:defRPr>
+            </a:lvl1pPr>
+            <a:lvl2pPr marL="685800" indent="-228600" algn="l" defTabSz="914400" rtl="0" eaLnBrk="1" latinLnBrk="0" hangingPunct="1">
+              <a:lnSpc>
+                <a:spcPct val="90000"/>
+              </a:lnSpc>
+              <a:spcBef>
+                <a:spcPts val="500"/>
+              </a:spcBef>
+              <a:buFont typeface="Arial" panose="020B0604020202020204" pitchFamily="34" charset="0"/>
+              <a:buChar char="•"/>
+              <a:defRPr sz="2400" kern="1200">
+                <a:solidFill>
+                  <a:schemeClr val="tx1"/>
+                </a:solidFill>
+                <a:latin typeface="+mn-lt"/>
+                <a:ea typeface="+mn-ea"/>
+                <a:cs typeface="+mn-cs"/>
+              </a:defRPr>
+            </a:lvl2pPr>
+            <a:lvl3pPr marL="1143000" indent="-228600" algn="l" defTabSz="914400" rtl="0" eaLnBrk="1" latinLnBrk="0" hangingPunct="1">
+              <a:lnSpc>
+                <a:spcPct val="90000"/>
+              </a:lnSpc>
+              <a:spcBef>
+                <a:spcPts val="500"/>
+              </a:spcBef>
+              <a:buFont typeface="Arial" panose="020B0604020202020204" pitchFamily="34" charset="0"/>
+              <a:buChar char="•"/>
+              <a:defRPr sz="2000" kern="1200">
+                <a:solidFill>
+                  <a:schemeClr val="tx1"/>
+                </a:solidFill>
+                <a:latin typeface="+mn-lt"/>
+                <a:ea typeface="+mn-ea"/>
+                <a:cs typeface="+mn-cs"/>
+              </a:defRPr>
+            </a:lvl3pPr>
+            <a:lvl4pPr marL="1600200" indent="-228600" algn="l" defTabSz="914400" rtl="0" eaLnBrk="1" latinLnBrk="0" hangingPunct="1">
+              <a:lnSpc>
+                <a:spcPct val="90000"/>
+              </a:lnSpc>
+              <a:spcBef>
+                <a:spcPts val="500"/>
+              </a:spcBef>
+              <a:buFont typeface="Arial" panose="020B0604020202020204" pitchFamily="34" charset="0"/>
+              <a:buChar char="•"/>
+              <a:defRPr sz="1800" kern="1200">
+                <a:solidFill>
+                  <a:schemeClr val="tx1"/>
+                </a:solidFill>
+                <a:latin typeface="+mn-lt"/>
+                <a:ea typeface="+mn-ea"/>
+                <a:cs typeface="+mn-cs"/>
+              </a:defRPr>
+            </a:lvl4pPr>
+            <a:lvl5pPr marL="2057400" indent="-228600" algn="l" defTabSz="914400" rtl="0" eaLnBrk="1" latinLnBrk="0" hangingPunct="1">
+              <a:lnSpc>
+                <a:spcPct val="90000"/>
+              </a:lnSpc>
+              <a:spcBef>
+                <a:spcPts val="500"/>
+              </a:spcBef>
+              <a:buFont typeface="Arial" panose="020B0604020202020204" pitchFamily="34" charset="0"/>
+              <a:buChar char="•"/>
+              <a:defRPr sz="1800" kern="1200">
+                <a:solidFill>
+                  <a:schemeClr val="tx1"/>
+                </a:solidFill>
+                <a:latin typeface="+mn-lt"/>
+                <a:ea typeface="+mn-ea"/>
+                <a:cs typeface="+mn-cs"/>
+              </a:defRPr>
+            </a:lvl5pPr>
+            <a:lvl6pPr marL="2514600" indent="-228600" algn="l" defTabSz="914400" rtl="0" eaLnBrk="1" latinLnBrk="0" hangingPunct="1">
+              <a:lnSpc>
+                <a:spcPct val="90000"/>
+              </a:lnSpc>
+              <a:spcBef>
+                <a:spcPts val="500"/>
+              </a:spcBef>
+              <a:buFont typeface="Arial" panose="020B0604020202020204" pitchFamily="34" charset="0"/>
+              <a:buChar char="•"/>
+              <a:defRPr sz="1800" kern="1200">
+                <a:solidFill>
+                  <a:schemeClr val="tx1"/>
+                </a:solidFill>
+                <a:latin typeface="+mn-lt"/>
+                <a:ea typeface="+mn-ea"/>
+                <a:cs typeface="+mn-cs"/>
+              </a:defRPr>
+            </a:lvl6pPr>
+            <a:lvl7pPr marL="2971800" indent="-228600" algn="l" defTabSz="914400" rtl="0" eaLnBrk="1" latinLnBrk="0" hangingPunct="1">
+              <a:lnSpc>
+                <a:spcPct val="90000"/>
+              </a:lnSpc>
+              <a:spcBef>
+                <a:spcPts val="500"/>
+              </a:spcBef>
+              <a:buFont typeface="Arial" panose="020B0604020202020204" pitchFamily="34" charset="0"/>
+              <a:buChar char="•"/>
+              <a:defRPr sz="1800" kern="1200">
+                <a:solidFill>
+                  <a:schemeClr val="tx1"/>
+                </a:solidFill>
+                <a:latin typeface="+mn-lt"/>
+                <a:ea typeface="+mn-ea"/>
+                <a:cs typeface="+mn-cs"/>
+              </a:defRPr>
+            </a:lvl7pPr>
+            <a:lvl8pPr marL="3429000" indent="-228600" algn="l" defTabSz="914400" rtl="0" eaLnBrk="1" latinLnBrk="0" hangingPunct="1">
+              <a:lnSpc>
+                <a:spcPct val="90000"/>
+              </a:lnSpc>
+              <a:spcBef>
+                <a:spcPts val="500"/>
+              </a:spcBef>
+              <a:buFont typeface="Arial" panose="020B0604020202020204" pitchFamily="34" charset="0"/>
+              <a:buChar char="•"/>
+              <a:defRPr sz="1800" kern="1200">
+                <a:solidFill>
+                  <a:schemeClr val="tx1"/>
+                </a:solidFill>
+                <a:latin typeface="+mn-lt"/>
+                <a:ea typeface="+mn-ea"/>
+                <a:cs typeface="+mn-cs"/>
+              </a:defRPr>
+            </a:lvl8pPr>
+            <a:lvl9pPr marL="3886200" indent="-228600" algn="l" defTabSz="914400" rtl="0" eaLnBrk="1" latinLnBrk="0" hangingPunct="1">
+              <a:lnSpc>
+                <a:spcPct val="90000"/>
+              </a:lnSpc>
+              <a:spcBef>
+                <a:spcPts val="500"/>
+              </a:spcBef>
+              <a:buFont typeface="Arial" panose="020B0604020202020204" pitchFamily="34" charset="0"/>
+              <a:buChar char="•"/>
+              <a:defRPr sz="1800" kern="1200">
+                <a:solidFill>
+                  <a:schemeClr val="tx1"/>
+                </a:solidFill>
+                <a:latin typeface="+mn-lt"/>
+                <a:ea typeface="+mn-ea"/>
+                <a:cs typeface="+mn-cs"/>
+              </a:defRPr>
+            </a:lvl9pPr>
+          </a:lstStyle>
+          <a:p>
+            <a:pPr marL="0" indent="0" algn="just">
+              <a:buNone/>
+            </a:pPr>
+            <a:endParaRPr lang="fr-FR" sz="1800" dirty="0">
+              <a:latin typeface="Times New Roman" panose="02020603050405020304" pitchFamily="18" charset="0"/>
+              <a:cs typeface="Times New Roman" panose="02020603050405020304" pitchFamily="18" charset="0"/>
+            </a:endParaRPr>
+          </a:p>
+          <a:p>
+            <a:pPr algn="just"/>
+            <a:r>
+              <a:rPr lang="fr-FR" sz="1800" kern="100" dirty="0">
+                <a:latin typeface="Times New Roman" panose="02020603050405020304" pitchFamily="18" charset="0"/>
+                <a:ea typeface="Aptos" panose="020B0004020202020204" pitchFamily="34" charset="0"/>
+                <a:cs typeface="Times New Roman" panose="02020603050405020304" pitchFamily="18" charset="0"/>
+              </a:rPr>
+              <a:t>Budget  limité : </a:t>
+            </a:r>
+            <a:r>
+              <a:rPr lang="fr-FR" sz="1200" i="1" dirty="0"/>
+              <a:t>Le projet n’a pas bénéficié d’un budget important, limitant l’acquisition de certains outils ou services (hébergement premium, solutions de sécurité avancées, etc.). Cela a impacté l'ampleur des fonctionnalités et la qualité de l'expérience utilisateur.</a:t>
+            </a:r>
+            <a:endParaRPr lang="fr-FR" sz="1800" i="1" kern="100" dirty="0">
+              <a:latin typeface="Times New Roman" panose="02020603050405020304" pitchFamily="18" charset="0"/>
+              <a:ea typeface="Aptos" panose="020B0004020202020204" pitchFamily="34" charset="0"/>
+              <a:cs typeface="Times New Roman" panose="02020603050405020304" pitchFamily="18" charset="0"/>
+            </a:endParaRPr>
+          </a:p>
+          <a:p>
+            <a:pPr algn="just"/>
+            <a:r>
+              <a:rPr lang="fr-FR" sz="1800" kern="100" dirty="0">
+                <a:effectLst/>
+                <a:latin typeface="Times New Roman" panose="02020603050405020304" pitchFamily="18" charset="0"/>
+                <a:ea typeface="Aptos" panose="020B0004020202020204" pitchFamily="34" charset="0"/>
+                <a:cs typeface="Times New Roman" panose="02020603050405020304" pitchFamily="18" charset="0"/>
+              </a:rPr>
+              <a:t>Ressources humaines : </a:t>
+            </a:r>
+            <a:r>
+              <a:rPr lang="fr-FR" sz="1200" i="1" dirty="0"/>
+              <a:t>Le projet a été réalisé avec une équipe restreinte, ce qui a limité la possibilité d'intégrer certaines fonctionnalités ou d'optimiser certains aspects techniques (performance, sécurité, etc.). Des tâches comme l'optimisation des algorithmes de recommandation ont été reportées à une phase ultérieure.</a:t>
+            </a:r>
+            <a:endParaRPr lang="fr-FR" sz="1800" i="1" kern="100" dirty="0">
+              <a:effectLst/>
+              <a:latin typeface="Times New Roman" panose="02020603050405020304" pitchFamily="18" charset="0"/>
+              <a:ea typeface="Aptos" panose="020B0004020202020204" pitchFamily="34" charset="0"/>
+              <a:cs typeface="Times New Roman" panose="02020603050405020304" pitchFamily="18" charset="0"/>
+            </a:endParaRPr>
+          </a:p>
+          <a:p>
+            <a:pPr algn="just"/>
+            <a:r>
+              <a:rPr lang="fr-FR" sz="1800" kern="100" dirty="0">
+                <a:latin typeface="Times New Roman" panose="02020603050405020304" pitchFamily="18" charset="0"/>
+                <a:ea typeface="Aptos" panose="020B0004020202020204" pitchFamily="34" charset="0"/>
+                <a:cs typeface="Times New Roman" panose="02020603050405020304" pitchFamily="18" charset="0"/>
+              </a:rPr>
+              <a:t>Temps de développement : </a:t>
+            </a:r>
+            <a:r>
+              <a:rPr lang="fr-FR" sz="1200" i="1" dirty="0"/>
+              <a:t>Le temps imparti pour réaliser le projet a imposé de prioriser certaines fonctionnalités au détriment d'autres. Certaines fonctionnalités, comme la messagerie privée ou la personnalisation avancée des profils utilisateurs, n'ont pas pu être développées dans les délais impartis.</a:t>
+            </a:r>
+            <a:endParaRPr lang="fr-FR" sz="1800" i="1" kern="100" dirty="0">
+              <a:effectLst/>
+              <a:latin typeface="Times New Roman" panose="02020603050405020304" pitchFamily="18" charset="0"/>
+              <a:ea typeface="Aptos" panose="020B0004020202020204" pitchFamily="34" charset="0"/>
+              <a:cs typeface="Times New Roman" panose="02020603050405020304" pitchFamily="18" charset="0"/>
+            </a:endParaRPr>
+          </a:p>
+        </p:txBody>
+      </p:sp>
     </p:spTree>
     <p:extLst>
       <p:ext uri="{BB962C8B-B14F-4D97-AF65-F5344CB8AC3E}">
@@ -10162,7 +10609,7 @@
         </p:nvSpPr>
         <p:spPr>
           <a:xfrm>
-            <a:off x="541759" y="1023668"/>
+            <a:off x="333719" y="2858004"/>
             <a:ext cx="3821305" cy="858800"/>
           </a:xfrm>
         </p:spPr>
@@ -10210,89 +10657,96 @@
           </a:p>
         </p:txBody>
       </p:sp>
-      <p:sp>
-        <p:nvSpPr>
-          <p:cNvPr id="4" name="Espace réservé du contenu 2">
+      <p:pic>
+        <p:nvPicPr>
+          <p:cNvPr id="7" name="Image 6">
             <a:extLst>
               <a:ext uri="{FF2B5EF4-FFF2-40B4-BE49-F238E27FC236}">
-                <a16:creationId xmlns:a16="http://schemas.microsoft.com/office/drawing/2014/main" id="{615E1F5C-5ABD-1EF0-9D0D-518359F30D84}"/>
+                <a16:creationId xmlns:a16="http://schemas.microsoft.com/office/drawing/2014/main" id="{4151BA5F-2D4A-891F-50B8-85EF4115AE00}"/>
               </a:ext>
             </a:extLst>
           </p:cNvPr>
-          <p:cNvSpPr>
-            <a:spLocks noGrp="1"/>
-          </p:cNvSpPr>
-          <p:nvPr>
-            <p:ph idx="1"/>
-            <p:custDataLst>
-              <p:tags r:id="rId6"/>
-            </p:custDataLst>
-          </p:nvPr>
-        </p:nvSpPr>
+          <p:cNvPicPr>
+            <a:picLocks noChangeAspect="1"/>
+          </p:cNvPicPr>
+          <p:nvPr/>
+        </p:nvPicPr>
+        <p:blipFill>
+          <a:blip r:embed="rId7"/>
+          <a:stretch>
+            <a:fillRect/>
+          </a:stretch>
+        </p:blipFill>
         <p:spPr>
           <a:xfrm>
-            <a:off x="1642971" y="2782256"/>
-            <a:ext cx="8454757" cy="2084711"/>
+            <a:off x="4488743" y="368300"/>
+            <a:ext cx="7577578" cy="1728724"/>
           </a:xfrm>
+          <a:prstGeom prst="rect">
+            <a:avLst/>
+          </a:prstGeom>
         </p:spPr>
-        <p:txBody>
-          <a:bodyPr>
-            <a:noAutofit/>
-          </a:bodyPr>
-          <a:lstStyle/>
-          <a:p>
-            <a:pPr algn="just"/>
-            <a:r>
-              <a:rPr lang="fr-FR" sz="1800" b="0" i="0" dirty="0">
-                <a:solidFill>
-                  <a:srgbClr val="000000"/>
-                </a:solidFill>
-                <a:effectLst/>
-                <a:latin typeface="Times New Roman" panose="02020603050405020304" pitchFamily="18" charset="0"/>
-                <a:cs typeface="Times New Roman" panose="02020603050405020304" pitchFamily="18" charset="0"/>
-              </a:rPr>
-              <a:t>En tant que lecteur inscrit, je veux ajouter un livre que j’ai apprécié à la bibliothèque afin de partager mes découvertes avec d’autres lecteurs. </a:t>
-            </a:r>
-          </a:p>
-          <a:p>
-            <a:pPr algn="just"/>
-            <a:r>
-              <a:rPr lang="fr-FR" sz="1800" b="0" i="0" dirty="0">
-                <a:solidFill>
-                  <a:srgbClr val="000000"/>
-                </a:solidFill>
-                <a:effectLst/>
-                <a:latin typeface="Times New Roman" panose="02020603050405020304" pitchFamily="18" charset="0"/>
-                <a:cs typeface="Times New Roman" panose="02020603050405020304" pitchFamily="18" charset="0"/>
-              </a:rPr>
-              <a:t>En tant que lecteur inscrit, je veux laisser un commentaire sur un livre que j’ai lu afin de partager mon avis et échanger avec d’autres utilisateurs autour de cette lecture. </a:t>
-            </a:r>
-          </a:p>
-          <a:p>
-            <a:pPr algn="just"/>
-            <a:r>
-              <a:rPr lang="fr-FR" sz="1800" b="0" i="0" dirty="0">
-                <a:solidFill>
-                  <a:srgbClr val="000000"/>
-                </a:solidFill>
-                <a:effectLst/>
-                <a:latin typeface="Times New Roman" panose="02020603050405020304" pitchFamily="18" charset="0"/>
-                <a:cs typeface="Times New Roman" panose="02020603050405020304" pitchFamily="18" charset="0"/>
-              </a:rPr>
-              <a:t>En tant que lecteur engagé je veux pouvoir interagir des discussions autour d’un livre en mettant des likes.</a:t>
-            </a:r>
-          </a:p>
-          <a:p>
-            <a:pPr marL="0" indent="0" algn="just">
-              <a:buNone/>
-            </a:pPr>
-            <a:endParaRPr lang="fr-FR" sz="1800" dirty="0">
-              <a:latin typeface="Times New Roman" panose="02020603050405020304" pitchFamily="18" charset="0"/>
-              <a:cs typeface="Times New Roman" panose="02020603050405020304" pitchFamily="18" charset="0"/>
-            </a:endParaRPr>
-          </a:p>
-        </p:txBody>
-      </p:sp>
+      </p:pic>
+      <p:pic>
+        <p:nvPicPr>
+          <p:cNvPr id="9" name="Image 8">
+            <a:extLst>
+              <a:ext uri="{FF2B5EF4-FFF2-40B4-BE49-F238E27FC236}">
+                <a16:creationId xmlns:a16="http://schemas.microsoft.com/office/drawing/2014/main" id="{E3F53F64-A9FC-D3BF-DAB8-A0CA4E0B956C}"/>
+              </a:ext>
+            </a:extLst>
+          </p:cNvPr>
+          <p:cNvPicPr>
+            <a:picLocks noChangeAspect="1"/>
+          </p:cNvPicPr>
+          <p:nvPr/>
+        </p:nvPicPr>
+        <p:blipFill>
+          <a:blip r:embed="rId8"/>
+          <a:stretch>
+            <a:fillRect/>
+          </a:stretch>
+        </p:blipFill>
+        <p:spPr>
+          <a:xfrm>
+            <a:off x="4488742" y="2488628"/>
+            <a:ext cx="7577578" cy="1597553"/>
+          </a:xfrm>
+          <a:prstGeom prst="rect">
+            <a:avLst/>
+          </a:prstGeom>
+        </p:spPr>
+      </p:pic>
+      <p:pic>
+        <p:nvPicPr>
+          <p:cNvPr id="11" name="Image 10">
+            <a:extLst>
+              <a:ext uri="{FF2B5EF4-FFF2-40B4-BE49-F238E27FC236}">
+                <a16:creationId xmlns:a16="http://schemas.microsoft.com/office/drawing/2014/main" id="{D77C4114-B1F1-D15A-B3AC-39B63460A4A8}"/>
+              </a:ext>
+            </a:extLst>
+          </p:cNvPr>
+          <p:cNvPicPr>
+            <a:picLocks noChangeAspect="1"/>
+          </p:cNvPicPr>
+          <p:nvPr/>
+        </p:nvPicPr>
+        <p:blipFill>
+          <a:blip r:embed="rId9"/>
+          <a:stretch>
+            <a:fillRect/>
+          </a:stretch>
+        </p:blipFill>
+        <p:spPr>
+          <a:xfrm>
+            <a:off x="4488742" y="4477786"/>
+            <a:ext cx="7577579" cy="1878564"/>
+          </a:xfrm>
+          <a:prstGeom prst="rect">
+            <a:avLst/>
+          </a:prstGeom>
+        </p:spPr>
+      </p:pic>
     </p:spTree>
     <p:extLst>
       <p:ext uri="{BB962C8B-B14F-4D97-AF65-F5344CB8AC3E}">
@@ -12844,40 +13298,6 @@
           </a:p>
         </p:txBody>
       </p:sp>
-      <p:pic>
-        <p:nvPicPr>
-          <p:cNvPr id="3" name="Image 2" descr="Une image contenant texte, capture d’écran, Police&#10;&#10;Description générée automatiquement">
-            <a:extLst>
-              <a:ext uri="{FF2B5EF4-FFF2-40B4-BE49-F238E27FC236}">
-                <a16:creationId xmlns:a16="http://schemas.microsoft.com/office/drawing/2014/main" id="{99839199-407D-FD42-7C0F-30A9AFDFE899}"/>
-              </a:ext>
-            </a:extLst>
-          </p:cNvPr>
-          <p:cNvPicPr>
-            <a:picLocks noChangeAspect="1"/>
-          </p:cNvPicPr>
-          <p:nvPr>
-            <p:custDataLst>
-              <p:tags r:id="rId5"/>
-            </p:custDataLst>
-          </p:nvPr>
-        </p:nvPicPr>
-        <p:blipFill>
-          <a:blip r:embed="rId13"/>
-          <a:stretch>
-            <a:fillRect/>
-          </a:stretch>
-        </p:blipFill>
-        <p:spPr>
-          <a:xfrm>
-            <a:off x="5488006" y="2810084"/>
-            <a:ext cx="6155141" cy="2415893"/>
-          </a:xfrm>
-          <a:prstGeom prst="rect">
-            <a:avLst/>
-          </a:prstGeom>
-        </p:spPr>
-      </p:pic>
       <p:sp>
         <p:nvSpPr>
           <p:cNvPr id="5" name="Espace réservé du numéro de diapositive 4">
@@ -12893,7 +13313,7 @@
           <p:nvPr>
             <p:ph type="sldNum" sz="quarter" idx="12"/>
             <p:custDataLst>
-              <p:tags r:id="rId6"/>
+              <p:tags r:id="rId5"/>
             </p:custDataLst>
           </p:nvPr>
         </p:nvSpPr>
@@ -12955,7 +13375,7 @@
           </p:cNvSpPr>
           <p:nvPr>
             <p:custDataLst>
-              <p:tags r:id="rId7"/>
+              <p:tags r:id="rId6"/>
             </p:custDataLst>
           </p:nvPr>
         </p:nvSpPr>
@@ -13179,7 +13599,7 @@
           </p:cNvSpPr>
           <p:nvPr>
             <p:custDataLst>
-              <p:tags r:id="rId8"/>
+              <p:tags r:id="rId7"/>
             </p:custDataLst>
           </p:nvPr>
         </p:nvSpPr>
@@ -13403,15 +13823,15 @@
           </p:cNvPicPr>
           <p:nvPr>
             <p:custDataLst>
-              <p:tags r:id="rId9"/>
+              <p:tags r:id="rId8"/>
             </p:custDataLst>
           </p:nvPr>
         </p:nvPicPr>
         <p:blipFill>
-          <a:blip r:embed="rId14">
+          <a:blip r:embed="rId12">
             <a:extLst>
               <a:ext uri="{96DAC541-7B7A-43D3-8B79-37D633B846F1}">
-                <asvg:svgBlip xmlns:asvg="http://schemas.microsoft.com/office/drawing/2016/SVG/main" r:embed="rId15"/>
+                <asvg:svgBlip xmlns:asvg="http://schemas.microsoft.com/office/drawing/2016/SVG/main" r:embed="rId13"/>
               </a:ext>
             </a:extLst>
           </a:blip>
@@ -13443,15 +13863,15 @@
           </p:cNvPicPr>
           <p:nvPr>
             <p:custDataLst>
-              <p:tags r:id="rId10"/>
+              <p:tags r:id="rId9"/>
             </p:custDataLst>
           </p:nvPr>
         </p:nvPicPr>
         <p:blipFill>
-          <a:blip r:embed="rId16">
+          <a:blip r:embed="rId14">
             <a:extLst>
               <a:ext uri="{96DAC541-7B7A-43D3-8B79-37D633B846F1}">
-                <asvg:svgBlip xmlns:asvg="http://schemas.microsoft.com/office/drawing/2016/SVG/main" r:embed="rId17"/>
+                <asvg:svgBlip xmlns:asvg="http://schemas.microsoft.com/office/drawing/2016/SVG/main" r:embed="rId15"/>
               </a:ext>
             </a:extLst>
           </a:blip>
@@ -13483,15 +13903,15 @@
           </p:cNvPicPr>
           <p:nvPr>
             <p:custDataLst>
-              <p:tags r:id="rId11"/>
+              <p:tags r:id="rId10"/>
             </p:custDataLst>
           </p:nvPr>
         </p:nvPicPr>
         <p:blipFill>
-          <a:blip r:embed="rId18">
+          <a:blip r:embed="rId16">
             <a:extLst>
               <a:ext uri="{96DAC541-7B7A-43D3-8B79-37D633B846F1}">
-                <asvg:svgBlip xmlns:asvg="http://schemas.microsoft.com/office/drawing/2016/SVG/main" r:embed="rId19"/>
+                <asvg:svgBlip xmlns:asvg="http://schemas.microsoft.com/office/drawing/2016/SVG/main" r:embed="rId17"/>
               </a:ext>
             </a:extLst>
           </a:blip>
@@ -13503,6 +13923,36 @@
           <a:xfrm>
             <a:off x="9292891" y="1543407"/>
             <a:ext cx="960592" cy="960592"/>
+          </a:xfrm>
+          <a:prstGeom prst="rect">
+            <a:avLst/>
+          </a:prstGeom>
+        </p:spPr>
+      </p:pic>
+      <p:pic>
+        <p:nvPicPr>
+          <p:cNvPr id="12" name="Image 11">
+            <a:extLst>
+              <a:ext uri="{FF2B5EF4-FFF2-40B4-BE49-F238E27FC236}">
+                <a16:creationId xmlns:a16="http://schemas.microsoft.com/office/drawing/2014/main" id="{FDE75C15-AAEF-0D81-4420-C66515A190FA}"/>
+              </a:ext>
+            </a:extLst>
+          </p:cNvPr>
+          <p:cNvPicPr>
+            <a:picLocks noChangeAspect="1"/>
+          </p:cNvPicPr>
+          <p:nvPr/>
+        </p:nvPicPr>
+        <p:blipFill>
+          <a:blip r:embed="rId18"/>
+          <a:stretch>
+            <a:fillRect/>
+          </a:stretch>
+        </p:blipFill>
+        <p:spPr>
+          <a:xfrm>
+            <a:off x="5278286" y="2479716"/>
+            <a:ext cx="6664627" cy="3981870"/>
           </a:xfrm>
           <a:prstGeom prst="rect">
             <a:avLst/>
@@ -16751,7 +17201,7 @@
       </p:grpSpPr>
       <p:sp useBgFill="1">
         <p:nvSpPr>
-          <p:cNvPr id="3079" name="Rectangle 3078">
+          <p:cNvPr id="3086" name="Rectangle 3085">
             <a:extLst>
               <a:ext uri="{FF2B5EF4-FFF2-40B4-BE49-F238E27FC236}">
                 <a16:creationId xmlns:a16="http://schemas.microsoft.com/office/drawing/2014/main" id="{3C54F4CE-85F0-46ED-80DA-9518C9251AD1}"/>
@@ -16827,7 +17277,7 @@
       </p:sp>
       <p:sp>
         <p:nvSpPr>
-          <p:cNvPr id="3081" name="Freeform: Shape 3080">
+          <p:cNvPr id="3088" name="Freeform: Shape 3087">
             <a:extLst>
               <a:ext uri="{FF2B5EF4-FFF2-40B4-BE49-F238E27FC236}">
                 <a16:creationId xmlns:a16="http://schemas.microsoft.com/office/drawing/2014/main" id="{DADD1FCA-8ACB-4958-81DD-4CDD6D3E1921}"/>
@@ -19375,7 +19825,7 @@
         </p:nvSpPr>
         <p:spPr>
           <a:xfrm>
-            <a:off x="773408" y="992094"/>
+            <a:off x="773408" y="1031422"/>
             <a:ext cx="3616913" cy="2795160"/>
           </a:xfrm>
         </p:spPr>
@@ -19428,10 +19878,10 @@
       </p:sp>
       <p:pic>
         <p:nvPicPr>
-          <p:cNvPr id="3074" name="Picture 2">
+          <p:cNvPr id="1026" name="Picture 2">
             <a:extLst>
               <a:ext uri="{FF2B5EF4-FFF2-40B4-BE49-F238E27FC236}">
-                <a16:creationId xmlns:a16="http://schemas.microsoft.com/office/drawing/2014/main" id="{AC3CA584-F070-7F99-FAAE-755BBA689408}"/>
+                <a16:creationId xmlns:a16="http://schemas.microsoft.com/office/drawing/2014/main" id="{7EFFCD05-60C9-6F79-33B0-E54A3B4CAA0F}"/>
               </a:ext>
             </a:extLst>
           </p:cNvPr>
@@ -19454,8 +19904,8 @@
         </p:blipFill>
         <p:spPr bwMode="auto">
           <a:xfrm>
-            <a:off x="7325249" y="121890"/>
-            <a:ext cx="2994780" cy="6655070"/>
+            <a:off x="7346536" y="83322"/>
+            <a:ext cx="2987167" cy="6638153"/>
           </a:xfrm>
           <a:prstGeom prst="rect">
             <a:avLst/>
@@ -20890,32 +21340,28 @@
       </p:sp>
       <p:pic>
         <p:nvPicPr>
-          <p:cNvPr id="6" name="Image 5">
+          <p:cNvPr id="9" name="Image 8">
             <a:extLst>
               <a:ext uri="{FF2B5EF4-FFF2-40B4-BE49-F238E27FC236}">
-                <a16:creationId xmlns:a16="http://schemas.microsoft.com/office/drawing/2014/main" id="{92339FB5-A551-414C-6649-BF3AEB629B79}"/>
+                <a16:creationId xmlns:a16="http://schemas.microsoft.com/office/drawing/2014/main" id="{E745BF02-6911-EDB2-CA19-E97F9A750D56}"/>
               </a:ext>
             </a:extLst>
           </p:cNvPr>
           <p:cNvPicPr>
             <a:picLocks noChangeAspect="1"/>
           </p:cNvPicPr>
-          <p:nvPr>
-            <p:custDataLst>
-              <p:tags r:id="rId6"/>
-            </p:custDataLst>
-          </p:nvPr>
+          <p:nvPr/>
         </p:nvPicPr>
         <p:blipFill>
-          <a:blip r:embed="rId8"/>
+          <a:blip r:embed="rId7"/>
           <a:stretch>
             <a:fillRect/>
           </a:stretch>
         </p:blipFill>
         <p:spPr>
           <a:xfrm>
-            <a:off x="4038600" y="999331"/>
-            <a:ext cx="6923098" cy="4887303"/>
+            <a:off x="3723640" y="335031"/>
+            <a:ext cx="7483488" cy="5730737"/>
           </a:xfrm>
           <a:prstGeom prst="rect">
             <a:avLst/>
@@ -23090,13 +23536,13 @@
         </p:nvSpPr>
         <p:spPr>
           <a:xfrm>
-            <a:off x="1040676" y="233848"/>
-            <a:ext cx="2406956" cy="1026367"/>
+            <a:off x="270123" y="95813"/>
+            <a:ext cx="2406956" cy="621118"/>
           </a:xfrm>
         </p:spPr>
         <p:txBody>
           <a:bodyPr anchor="b">
-            <a:normAutofit/>
+            <a:normAutofit fontScale="90000"/>
           </a:bodyPr>
           <a:lstStyle/>
           <a:p>
@@ -23131,7 +23577,7 @@
         </p:nvSpPr>
         <p:spPr>
           <a:xfrm>
-            <a:off x="4493694" y="1914446"/>
+            <a:off x="4488308" y="1618728"/>
             <a:ext cx="5550366" cy="2304602"/>
           </a:xfrm>
         </p:spPr>
@@ -23394,7 +23840,7 @@
         </p:nvSpPr>
         <p:spPr>
           <a:xfrm>
-            <a:off x="4493694" y="3985618"/>
+            <a:off x="4431834" y="3658253"/>
             <a:ext cx="5550366" cy="1496310"/>
           </a:xfrm>
           <a:prstGeom prst="rect">
@@ -23585,7 +24031,7 @@
                 <a:latin typeface="Times New Roman" panose="02020603050405020304" pitchFamily="18" charset="0"/>
                 <a:cs typeface="Times New Roman" panose="02020603050405020304" pitchFamily="18" charset="0"/>
               </a:rPr>
-              <a:t>Motiver par l’envie de découvrir des livres qui ne sont pas proposés par des grandes publicités.</a:t>
+              <a:t>Motiver par l’envie de découvrir des livres qui ne sont pas proposés par des grandes publicités. </a:t>
             </a:r>
           </a:p>
           <a:p>
@@ -23660,7 +24106,7 @@
           </p:nvPr>
         </p:nvPicPr>
         <p:blipFill>
-          <a:blip r:embed="rId12">
+          <a:blip r:embed="rId13">
             <a:extLst>
               <a:ext uri="{28A0092B-C50C-407E-A947-70E740481C1C}">
                 <a14:useLocalDpi xmlns:a14="http://schemas.microsoft.com/office/drawing/2010/main" val="0"/>
@@ -23673,7 +24119,7 @@
         </p:blipFill>
         <p:spPr>
           <a:xfrm>
-            <a:off x="439510" y="1951020"/>
+            <a:off x="439510" y="2019844"/>
             <a:ext cx="3271178" cy="3271178"/>
           </a:xfrm>
           <a:prstGeom prst="rect">
@@ -23701,7 +24147,7 @@
         </p:nvSpPr>
         <p:spPr>
           <a:xfrm>
-            <a:off x="270124" y="5481329"/>
+            <a:off x="270123" y="750591"/>
             <a:ext cx="3948060" cy="330169"/>
           </a:xfrm>
           <a:prstGeom prst="rect">
@@ -23921,8 +24367,8 @@
         </p:nvSpPr>
         <p:spPr>
           <a:xfrm>
-            <a:off x="270123" y="5810900"/>
-            <a:ext cx="7143399" cy="330169"/>
+            <a:off x="270123" y="1084628"/>
+            <a:ext cx="3768477" cy="330169"/>
           </a:xfrm>
           <a:prstGeom prst="rect">
             <a:avLst/>
@@ -24121,6 +24567,271 @@
           </a:p>
         </p:txBody>
       </p:sp>
+      <p:sp>
+        <p:nvSpPr>
+          <p:cNvPr id="6" name="Flèche : angle droit 5">
+            <a:extLst>
+              <a:ext uri="{FF2B5EF4-FFF2-40B4-BE49-F238E27FC236}">
+                <a16:creationId xmlns:a16="http://schemas.microsoft.com/office/drawing/2014/main" id="{80ACDBAE-A2CF-8248-87E8-8C849C2DEC2C}"/>
+              </a:ext>
+            </a:extLst>
+          </p:cNvPr>
+          <p:cNvSpPr/>
+          <p:nvPr/>
+        </p:nvSpPr>
+        <p:spPr>
+          <a:xfrm rot="5400000">
+            <a:off x="5598695" y="5026747"/>
+            <a:ext cx="497305" cy="421599"/>
+          </a:xfrm>
+          <a:prstGeom prst="bentUpArrow">
+            <a:avLst/>
+          </a:prstGeom>
+          <a:solidFill>
+            <a:schemeClr val="tx1"/>
+          </a:solidFill>
+        </p:spPr>
+        <p:style>
+          <a:lnRef idx="2">
+            <a:schemeClr val="accent1">
+              <a:shade val="15000"/>
+            </a:schemeClr>
+          </a:lnRef>
+          <a:fillRef idx="1">
+            <a:schemeClr val="accent1"/>
+          </a:fillRef>
+          <a:effectRef idx="0">
+            <a:schemeClr val="accent1"/>
+          </a:effectRef>
+          <a:fontRef idx="minor">
+            <a:schemeClr val="lt1"/>
+          </a:fontRef>
+        </p:style>
+        <p:txBody>
+          <a:bodyPr rtlCol="0" anchor="ctr"/>
+          <a:lstStyle/>
+          <a:p>
+            <a:pPr algn="ctr"/>
+            <a:endParaRPr lang="fr-FR" dirty="0">
+              <a:solidFill>
+                <a:schemeClr val="tx1"/>
+              </a:solidFill>
+              <a:highlight>
+                <a:srgbClr val="000000"/>
+              </a:highlight>
+            </a:endParaRPr>
+          </a:p>
+        </p:txBody>
+      </p:sp>
+      <p:sp>
+        <p:nvSpPr>
+          <p:cNvPr id="8" name="Espace réservé du contenu 6">
+            <a:extLst>
+              <a:ext uri="{FF2B5EF4-FFF2-40B4-BE49-F238E27FC236}">
+                <a16:creationId xmlns:a16="http://schemas.microsoft.com/office/drawing/2014/main" id="{8469BE72-D367-25F1-47A5-19AC05EF4E08}"/>
+              </a:ext>
+            </a:extLst>
+          </p:cNvPr>
+          <p:cNvSpPr txBox="1">
+            <a:spLocks/>
+          </p:cNvSpPr>
+          <p:nvPr>
+            <p:custDataLst>
+              <p:tags r:id="rId11"/>
+            </p:custDataLst>
+          </p:nvPr>
+        </p:nvSpPr>
+        <p:spPr>
+          <a:xfrm>
+            <a:off x="6096000" y="5108857"/>
+            <a:ext cx="5550366" cy="708082"/>
+          </a:xfrm>
+          <a:prstGeom prst="rect">
+            <a:avLst/>
+          </a:prstGeom>
+        </p:spPr>
+        <p:txBody>
+          <a:bodyPr vert="horz" lIns="91440" tIns="45720" rIns="91440" bIns="45720" rtlCol="0" anchor="t">
+            <a:noAutofit/>
+          </a:bodyPr>
+          <a:lstStyle>
+            <a:lvl1pPr marL="228600" indent="-228600" algn="l" defTabSz="914400" rtl="0" eaLnBrk="1" latinLnBrk="0" hangingPunct="1">
+              <a:lnSpc>
+                <a:spcPct val="90000"/>
+              </a:lnSpc>
+              <a:spcBef>
+                <a:spcPts val="1000"/>
+              </a:spcBef>
+              <a:buFont typeface="Arial" panose="020B0604020202020204" pitchFamily="34" charset="0"/>
+              <a:buChar char="•"/>
+              <a:defRPr sz="2800" kern="1200">
+                <a:solidFill>
+                  <a:schemeClr val="tx1"/>
+                </a:solidFill>
+                <a:latin typeface="+mn-lt"/>
+                <a:ea typeface="+mn-ea"/>
+                <a:cs typeface="+mn-cs"/>
+              </a:defRPr>
+            </a:lvl1pPr>
+            <a:lvl2pPr marL="685800" indent="-228600" algn="l" defTabSz="914400" rtl="0" eaLnBrk="1" latinLnBrk="0" hangingPunct="1">
+              <a:lnSpc>
+                <a:spcPct val="90000"/>
+              </a:lnSpc>
+              <a:spcBef>
+                <a:spcPts val="500"/>
+              </a:spcBef>
+              <a:buFont typeface="Arial" panose="020B0604020202020204" pitchFamily="34" charset="0"/>
+              <a:buChar char="•"/>
+              <a:defRPr sz="2400" kern="1200">
+                <a:solidFill>
+                  <a:schemeClr val="tx1"/>
+                </a:solidFill>
+                <a:latin typeface="+mn-lt"/>
+                <a:ea typeface="+mn-ea"/>
+                <a:cs typeface="+mn-cs"/>
+              </a:defRPr>
+            </a:lvl2pPr>
+            <a:lvl3pPr marL="1143000" indent="-228600" algn="l" defTabSz="914400" rtl="0" eaLnBrk="1" latinLnBrk="0" hangingPunct="1">
+              <a:lnSpc>
+                <a:spcPct val="90000"/>
+              </a:lnSpc>
+              <a:spcBef>
+                <a:spcPts val="500"/>
+              </a:spcBef>
+              <a:buFont typeface="Arial" panose="020B0604020202020204" pitchFamily="34" charset="0"/>
+              <a:buChar char="•"/>
+              <a:defRPr sz="2000" kern="1200">
+                <a:solidFill>
+                  <a:schemeClr val="tx1"/>
+                </a:solidFill>
+                <a:latin typeface="+mn-lt"/>
+                <a:ea typeface="+mn-ea"/>
+                <a:cs typeface="+mn-cs"/>
+              </a:defRPr>
+            </a:lvl3pPr>
+            <a:lvl4pPr marL="1600200" indent="-228600" algn="l" defTabSz="914400" rtl="0" eaLnBrk="1" latinLnBrk="0" hangingPunct="1">
+              <a:lnSpc>
+                <a:spcPct val="90000"/>
+              </a:lnSpc>
+              <a:spcBef>
+                <a:spcPts val="500"/>
+              </a:spcBef>
+              <a:buFont typeface="Arial" panose="020B0604020202020204" pitchFamily="34" charset="0"/>
+              <a:buChar char="•"/>
+              <a:defRPr sz="1800" kern="1200">
+                <a:solidFill>
+                  <a:schemeClr val="tx1"/>
+                </a:solidFill>
+                <a:latin typeface="+mn-lt"/>
+                <a:ea typeface="+mn-ea"/>
+                <a:cs typeface="+mn-cs"/>
+              </a:defRPr>
+            </a:lvl4pPr>
+            <a:lvl5pPr marL="2057400" indent="-228600" algn="l" defTabSz="914400" rtl="0" eaLnBrk="1" latinLnBrk="0" hangingPunct="1">
+              <a:lnSpc>
+                <a:spcPct val="90000"/>
+              </a:lnSpc>
+              <a:spcBef>
+                <a:spcPts val="500"/>
+              </a:spcBef>
+              <a:buFont typeface="Arial" panose="020B0604020202020204" pitchFamily="34" charset="0"/>
+              <a:buChar char="•"/>
+              <a:defRPr sz="1800" kern="1200">
+                <a:solidFill>
+                  <a:schemeClr val="tx1"/>
+                </a:solidFill>
+                <a:latin typeface="+mn-lt"/>
+                <a:ea typeface="+mn-ea"/>
+                <a:cs typeface="+mn-cs"/>
+              </a:defRPr>
+            </a:lvl5pPr>
+            <a:lvl6pPr marL="2514600" indent="-228600" algn="l" defTabSz="914400" rtl="0" eaLnBrk="1" latinLnBrk="0" hangingPunct="1">
+              <a:lnSpc>
+                <a:spcPct val="90000"/>
+              </a:lnSpc>
+              <a:spcBef>
+                <a:spcPts val="500"/>
+              </a:spcBef>
+              <a:buFont typeface="Arial" panose="020B0604020202020204" pitchFamily="34" charset="0"/>
+              <a:buChar char="•"/>
+              <a:defRPr sz="1800" kern="1200">
+                <a:solidFill>
+                  <a:schemeClr val="tx1"/>
+                </a:solidFill>
+                <a:latin typeface="+mn-lt"/>
+                <a:ea typeface="+mn-ea"/>
+                <a:cs typeface="+mn-cs"/>
+              </a:defRPr>
+            </a:lvl6pPr>
+            <a:lvl7pPr marL="2971800" indent="-228600" algn="l" defTabSz="914400" rtl="0" eaLnBrk="1" latinLnBrk="0" hangingPunct="1">
+              <a:lnSpc>
+                <a:spcPct val="90000"/>
+              </a:lnSpc>
+              <a:spcBef>
+                <a:spcPts val="500"/>
+              </a:spcBef>
+              <a:buFont typeface="Arial" panose="020B0604020202020204" pitchFamily="34" charset="0"/>
+              <a:buChar char="•"/>
+              <a:defRPr sz="1800" kern="1200">
+                <a:solidFill>
+                  <a:schemeClr val="tx1"/>
+                </a:solidFill>
+                <a:latin typeface="+mn-lt"/>
+                <a:ea typeface="+mn-ea"/>
+                <a:cs typeface="+mn-cs"/>
+              </a:defRPr>
+            </a:lvl7pPr>
+            <a:lvl8pPr marL="3429000" indent="-228600" algn="l" defTabSz="914400" rtl="0" eaLnBrk="1" latinLnBrk="0" hangingPunct="1">
+              <a:lnSpc>
+                <a:spcPct val="90000"/>
+              </a:lnSpc>
+              <a:spcBef>
+                <a:spcPts val="500"/>
+              </a:spcBef>
+              <a:buFont typeface="Arial" panose="020B0604020202020204" pitchFamily="34" charset="0"/>
+              <a:buChar char="•"/>
+              <a:defRPr sz="1800" kern="1200">
+                <a:solidFill>
+                  <a:schemeClr val="tx1"/>
+                </a:solidFill>
+                <a:latin typeface="+mn-lt"/>
+                <a:ea typeface="+mn-ea"/>
+                <a:cs typeface="+mn-cs"/>
+              </a:defRPr>
+            </a:lvl8pPr>
+            <a:lvl9pPr marL="3886200" indent="-228600" algn="l" defTabSz="914400" rtl="0" eaLnBrk="1" latinLnBrk="0" hangingPunct="1">
+              <a:lnSpc>
+                <a:spcPct val="90000"/>
+              </a:lnSpc>
+              <a:spcBef>
+                <a:spcPts val="500"/>
+              </a:spcBef>
+              <a:buFont typeface="Arial" panose="020B0604020202020204" pitchFamily="34" charset="0"/>
+              <a:buChar char="•"/>
+              <a:defRPr sz="1800" kern="1200">
+                <a:solidFill>
+                  <a:schemeClr val="tx1"/>
+                </a:solidFill>
+                <a:latin typeface="+mn-lt"/>
+                <a:ea typeface="+mn-ea"/>
+                <a:cs typeface="+mn-cs"/>
+              </a:defRPr>
+            </a:lvl9pPr>
+          </a:lstStyle>
+          <a:p>
+            <a:pPr marL="0" indent="0" algn="just">
+              <a:buNone/>
+            </a:pPr>
+            <a:r>
+              <a:rPr lang="fr-FR" sz="1800" dirty="0">
+                <a:latin typeface="Times New Roman" panose="02020603050405020304" pitchFamily="18" charset="0"/>
+                <a:cs typeface="Times New Roman" panose="02020603050405020304" pitchFamily="18" charset="0"/>
+              </a:rPr>
+              <a:t>Camille souhaite découvrir des livres grâce à des recommandations dans une discussion</a:t>
+            </a:r>
+          </a:p>
+        </p:txBody>
+      </p:sp>
     </p:spTree>
     <p:extLst>
       <p:ext uri="{BB962C8B-B14F-4D97-AF65-F5344CB8AC3E}">
@@ -24251,8 +24962,8 @@
         </p:nvSpPr>
         <p:spPr>
           <a:xfrm>
-            <a:off x="1040676" y="149650"/>
-            <a:ext cx="2406956" cy="1026367"/>
+            <a:off x="337815" y="22519"/>
+            <a:ext cx="2406956" cy="679250"/>
           </a:xfrm>
         </p:spPr>
         <p:txBody>
@@ -24292,7 +25003,7 @@
         </p:nvSpPr>
         <p:spPr>
           <a:xfrm>
-            <a:off x="4514014" y="1520497"/>
+            <a:off x="4514014" y="1264849"/>
             <a:ext cx="5550366" cy="2304602"/>
           </a:xfrm>
         </p:spPr>
@@ -24559,7 +25270,7 @@
         </p:nvSpPr>
         <p:spPr>
           <a:xfrm>
-            <a:off x="4514014" y="3825099"/>
+            <a:off x="4514014" y="3480959"/>
             <a:ext cx="5550366" cy="1834021"/>
           </a:xfrm>
           <a:prstGeom prst="rect">
@@ -24829,7 +25540,7 @@
           <p:nvPr/>
         </p:nvPicPr>
         <p:blipFill>
-          <a:blip r:embed="rId11">
+          <a:blip r:embed="rId12">
             <a:extLst>
               <a:ext uri="{28A0092B-C50C-407E-A947-70E740481C1C}">
                 <a14:useLocalDpi xmlns:a14="http://schemas.microsoft.com/office/drawing/2010/main" val="0"/>
@@ -24842,7 +25553,7 @@
         </p:blipFill>
         <p:spPr>
           <a:xfrm>
-            <a:off x="416473" y="1911675"/>
+            <a:off x="416473" y="2383623"/>
             <a:ext cx="3240428" cy="3240428"/>
           </a:xfrm>
           <a:prstGeom prst="rect">
@@ -24870,7 +25581,7 @@
         </p:nvSpPr>
         <p:spPr>
           <a:xfrm>
-            <a:off x="416473" y="5378654"/>
+            <a:off x="337815" y="835005"/>
             <a:ext cx="2992513" cy="568099"/>
           </a:xfrm>
           <a:prstGeom prst="rect">
@@ -25090,8 +25801,8 @@
         </p:nvSpPr>
         <p:spPr>
           <a:xfrm>
-            <a:off x="416473" y="5723685"/>
-            <a:ext cx="7380359" cy="568099"/>
+            <a:off x="337815" y="1196300"/>
+            <a:ext cx="3240429" cy="568099"/>
           </a:xfrm>
           <a:prstGeom prst="rect">
             <a:avLst/>
@@ -25290,6 +26001,278 @@
           </a:p>
         </p:txBody>
       </p:sp>
+      <p:sp>
+        <p:nvSpPr>
+          <p:cNvPr id="5" name="Flèche : angle droit 4">
+            <a:extLst>
+              <a:ext uri="{FF2B5EF4-FFF2-40B4-BE49-F238E27FC236}">
+                <a16:creationId xmlns:a16="http://schemas.microsoft.com/office/drawing/2014/main" id="{8658B9F7-3CB8-CA5E-A8A2-559217869CB2}"/>
+              </a:ext>
+            </a:extLst>
+          </p:cNvPr>
+          <p:cNvSpPr/>
+          <p:nvPr/>
+        </p:nvSpPr>
+        <p:spPr>
+          <a:xfrm rot="5400000">
+            <a:off x="5773389" y="5357258"/>
+            <a:ext cx="497305" cy="421599"/>
+          </a:xfrm>
+          <a:prstGeom prst="bentUpArrow">
+            <a:avLst/>
+          </a:prstGeom>
+          <a:solidFill>
+            <a:schemeClr val="tx1"/>
+          </a:solidFill>
+        </p:spPr>
+        <p:style>
+          <a:lnRef idx="2">
+            <a:schemeClr val="accent1">
+              <a:shade val="15000"/>
+            </a:schemeClr>
+          </a:lnRef>
+          <a:fillRef idx="1">
+            <a:schemeClr val="accent1"/>
+          </a:fillRef>
+          <a:effectRef idx="0">
+            <a:schemeClr val="accent1"/>
+          </a:effectRef>
+          <a:fontRef idx="minor">
+            <a:schemeClr val="lt1"/>
+          </a:fontRef>
+        </p:style>
+        <p:txBody>
+          <a:bodyPr rtlCol="0" anchor="ctr"/>
+          <a:lstStyle/>
+          <a:p>
+            <a:pPr algn="ctr"/>
+            <a:endParaRPr lang="fr-FR" dirty="0">
+              <a:solidFill>
+                <a:schemeClr val="tx1"/>
+              </a:solidFill>
+              <a:highlight>
+                <a:srgbClr val="000000"/>
+              </a:highlight>
+            </a:endParaRPr>
+          </a:p>
+        </p:txBody>
+      </p:sp>
+      <p:sp>
+        <p:nvSpPr>
+          <p:cNvPr id="8" name="Espace réservé du contenu 6">
+            <a:extLst>
+              <a:ext uri="{FF2B5EF4-FFF2-40B4-BE49-F238E27FC236}">
+                <a16:creationId xmlns:a16="http://schemas.microsoft.com/office/drawing/2014/main" id="{1752539A-FA7B-3A2D-69B4-78E0884F6765}"/>
+              </a:ext>
+            </a:extLst>
+          </p:cNvPr>
+          <p:cNvSpPr txBox="1">
+            <a:spLocks/>
+          </p:cNvSpPr>
+          <p:nvPr>
+            <p:custDataLst>
+              <p:tags r:id="rId10"/>
+            </p:custDataLst>
+          </p:nvPr>
+        </p:nvSpPr>
+        <p:spPr>
+          <a:xfrm>
+            <a:off x="6273461" y="5402578"/>
+            <a:ext cx="5550366" cy="772224"/>
+          </a:xfrm>
+          <a:prstGeom prst="rect">
+            <a:avLst/>
+          </a:prstGeom>
+        </p:spPr>
+        <p:txBody>
+          <a:bodyPr vert="horz" lIns="91440" tIns="45720" rIns="91440" bIns="45720" rtlCol="0" anchor="t">
+            <a:noAutofit/>
+          </a:bodyPr>
+          <a:lstStyle>
+            <a:lvl1pPr marL="228600" indent="-228600" algn="l" defTabSz="914400" rtl="0" eaLnBrk="1" latinLnBrk="0" hangingPunct="1">
+              <a:lnSpc>
+                <a:spcPct val="90000"/>
+              </a:lnSpc>
+              <a:spcBef>
+                <a:spcPts val="1000"/>
+              </a:spcBef>
+              <a:buFont typeface="Arial" panose="020B0604020202020204" pitchFamily="34" charset="0"/>
+              <a:buChar char="•"/>
+              <a:defRPr sz="2800" kern="1200">
+                <a:solidFill>
+                  <a:schemeClr val="tx1"/>
+                </a:solidFill>
+                <a:latin typeface="+mn-lt"/>
+                <a:ea typeface="+mn-ea"/>
+                <a:cs typeface="+mn-cs"/>
+              </a:defRPr>
+            </a:lvl1pPr>
+            <a:lvl2pPr marL="685800" indent="-228600" algn="l" defTabSz="914400" rtl="0" eaLnBrk="1" latinLnBrk="0" hangingPunct="1">
+              <a:lnSpc>
+                <a:spcPct val="90000"/>
+              </a:lnSpc>
+              <a:spcBef>
+                <a:spcPts val="500"/>
+              </a:spcBef>
+              <a:buFont typeface="Arial" panose="020B0604020202020204" pitchFamily="34" charset="0"/>
+              <a:buChar char="•"/>
+              <a:defRPr sz="2400" kern="1200">
+                <a:solidFill>
+                  <a:schemeClr val="tx1"/>
+                </a:solidFill>
+                <a:latin typeface="+mn-lt"/>
+                <a:ea typeface="+mn-ea"/>
+                <a:cs typeface="+mn-cs"/>
+              </a:defRPr>
+            </a:lvl2pPr>
+            <a:lvl3pPr marL="1143000" indent="-228600" algn="l" defTabSz="914400" rtl="0" eaLnBrk="1" latinLnBrk="0" hangingPunct="1">
+              <a:lnSpc>
+                <a:spcPct val="90000"/>
+              </a:lnSpc>
+              <a:spcBef>
+                <a:spcPts val="500"/>
+              </a:spcBef>
+              <a:buFont typeface="Arial" panose="020B0604020202020204" pitchFamily="34" charset="0"/>
+              <a:buChar char="•"/>
+              <a:defRPr sz="2000" kern="1200">
+                <a:solidFill>
+                  <a:schemeClr val="tx1"/>
+                </a:solidFill>
+                <a:latin typeface="+mn-lt"/>
+                <a:ea typeface="+mn-ea"/>
+                <a:cs typeface="+mn-cs"/>
+              </a:defRPr>
+            </a:lvl3pPr>
+            <a:lvl4pPr marL="1600200" indent="-228600" algn="l" defTabSz="914400" rtl="0" eaLnBrk="1" latinLnBrk="0" hangingPunct="1">
+              <a:lnSpc>
+                <a:spcPct val="90000"/>
+              </a:lnSpc>
+              <a:spcBef>
+                <a:spcPts val="500"/>
+              </a:spcBef>
+              <a:buFont typeface="Arial" panose="020B0604020202020204" pitchFamily="34" charset="0"/>
+              <a:buChar char="•"/>
+              <a:defRPr sz="1800" kern="1200">
+                <a:solidFill>
+                  <a:schemeClr val="tx1"/>
+                </a:solidFill>
+                <a:latin typeface="+mn-lt"/>
+                <a:ea typeface="+mn-ea"/>
+                <a:cs typeface="+mn-cs"/>
+              </a:defRPr>
+            </a:lvl4pPr>
+            <a:lvl5pPr marL="2057400" indent="-228600" algn="l" defTabSz="914400" rtl="0" eaLnBrk="1" latinLnBrk="0" hangingPunct="1">
+              <a:lnSpc>
+                <a:spcPct val="90000"/>
+              </a:lnSpc>
+              <a:spcBef>
+                <a:spcPts val="500"/>
+              </a:spcBef>
+              <a:buFont typeface="Arial" panose="020B0604020202020204" pitchFamily="34" charset="0"/>
+              <a:buChar char="•"/>
+              <a:defRPr sz="1800" kern="1200">
+                <a:solidFill>
+                  <a:schemeClr val="tx1"/>
+                </a:solidFill>
+                <a:latin typeface="+mn-lt"/>
+                <a:ea typeface="+mn-ea"/>
+                <a:cs typeface="+mn-cs"/>
+              </a:defRPr>
+            </a:lvl5pPr>
+            <a:lvl6pPr marL="2514600" indent="-228600" algn="l" defTabSz="914400" rtl="0" eaLnBrk="1" latinLnBrk="0" hangingPunct="1">
+              <a:lnSpc>
+                <a:spcPct val="90000"/>
+              </a:lnSpc>
+              <a:spcBef>
+                <a:spcPts val="500"/>
+              </a:spcBef>
+              <a:buFont typeface="Arial" panose="020B0604020202020204" pitchFamily="34" charset="0"/>
+              <a:buChar char="•"/>
+              <a:defRPr sz="1800" kern="1200">
+                <a:solidFill>
+                  <a:schemeClr val="tx1"/>
+                </a:solidFill>
+                <a:latin typeface="+mn-lt"/>
+                <a:ea typeface="+mn-ea"/>
+                <a:cs typeface="+mn-cs"/>
+              </a:defRPr>
+            </a:lvl6pPr>
+            <a:lvl7pPr marL="2971800" indent="-228600" algn="l" defTabSz="914400" rtl="0" eaLnBrk="1" latinLnBrk="0" hangingPunct="1">
+              <a:lnSpc>
+                <a:spcPct val="90000"/>
+              </a:lnSpc>
+              <a:spcBef>
+                <a:spcPts val="500"/>
+              </a:spcBef>
+              <a:buFont typeface="Arial" panose="020B0604020202020204" pitchFamily="34" charset="0"/>
+              <a:buChar char="•"/>
+              <a:defRPr sz="1800" kern="1200">
+                <a:solidFill>
+                  <a:schemeClr val="tx1"/>
+                </a:solidFill>
+                <a:latin typeface="+mn-lt"/>
+                <a:ea typeface="+mn-ea"/>
+                <a:cs typeface="+mn-cs"/>
+              </a:defRPr>
+            </a:lvl7pPr>
+            <a:lvl8pPr marL="3429000" indent="-228600" algn="l" defTabSz="914400" rtl="0" eaLnBrk="1" latinLnBrk="0" hangingPunct="1">
+              <a:lnSpc>
+                <a:spcPct val="90000"/>
+              </a:lnSpc>
+              <a:spcBef>
+                <a:spcPts val="500"/>
+              </a:spcBef>
+              <a:buFont typeface="Arial" panose="020B0604020202020204" pitchFamily="34" charset="0"/>
+              <a:buChar char="•"/>
+              <a:defRPr sz="1800" kern="1200">
+                <a:solidFill>
+                  <a:schemeClr val="tx1"/>
+                </a:solidFill>
+                <a:latin typeface="+mn-lt"/>
+                <a:ea typeface="+mn-ea"/>
+                <a:cs typeface="+mn-cs"/>
+              </a:defRPr>
+            </a:lvl8pPr>
+            <a:lvl9pPr marL="3886200" indent="-228600" algn="l" defTabSz="914400" rtl="0" eaLnBrk="1" latinLnBrk="0" hangingPunct="1">
+              <a:lnSpc>
+                <a:spcPct val="90000"/>
+              </a:lnSpc>
+              <a:spcBef>
+                <a:spcPts val="500"/>
+              </a:spcBef>
+              <a:buFont typeface="Arial" panose="020B0604020202020204" pitchFamily="34" charset="0"/>
+              <a:buChar char="•"/>
+              <a:defRPr sz="1800" kern="1200">
+                <a:solidFill>
+                  <a:schemeClr val="tx1"/>
+                </a:solidFill>
+                <a:latin typeface="+mn-lt"/>
+                <a:ea typeface="+mn-ea"/>
+                <a:cs typeface="+mn-cs"/>
+              </a:defRPr>
+            </a:lvl9pPr>
+          </a:lstStyle>
+          <a:p>
+            <a:pPr marL="0" indent="0" algn="just">
+              <a:buNone/>
+            </a:pPr>
+            <a:r>
+              <a:rPr lang="fr-FR" sz="1800" dirty="0">
+                <a:latin typeface="Times New Roman" panose="02020603050405020304" pitchFamily="18" charset="0"/>
+                <a:cs typeface="Times New Roman" panose="02020603050405020304" pitchFamily="18" charset="0"/>
+              </a:rPr>
+              <a:t>Luc souhaite faire découvrir ses livres et partager ses conseils aux plus jeunes lecteurs</a:t>
+            </a:r>
+            <a:r>
+              <a:rPr lang="fr-FR" sz="1800" b="1" dirty="0">
+                <a:latin typeface="Times New Roman" panose="02020603050405020304" pitchFamily="18" charset="0"/>
+                <a:cs typeface="Times New Roman" panose="02020603050405020304" pitchFamily="18" charset="0"/>
+              </a:rPr>
+              <a:t> </a:t>
+            </a:r>
+          </a:p>
+        </p:txBody>
+      </p:sp>
     </p:spTree>
     <p:extLst>
       <p:ext uri="{BB962C8B-B14F-4D97-AF65-F5344CB8AC3E}">
@@ -25420,13 +26403,13 @@
         </p:nvSpPr>
         <p:spPr>
           <a:xfrm>
-            <a:off x="995262" y="149650"/>
-            <a:ext cx="2406956" cy="1026367"/>
+            <a:off x="130024" y="96337"/>
+            <a:ext cx="2406956" cy="625411"/>
           </a:xfrm>
         </p:spPr>
         <p:txBody>
           <a:bodyPr anchor="b">
-            <a:normAutofit/>
+            <a:normAutofit fontScale="90000"/>
           </a:bodyPr>
           <a:lstStyle/>
           <a:p>
@@ -26045,7 +27028,7 @@
           </p:nvPr>
         </p:nvPicPr>
         <p:blipFill>
-          <a:blip r:embed="rId12">
+          <a:blip r:embed="rId13">
             <a:extLst>
               <a:ext uri="{28A0092B-C50C-407E-A947-70E740481C1C}">
                 <a14:useLocalDpi xmlns:a14="http://schemas.microsoft.com/office/drawing/2010/main" val="0"/>
@@ -26058,7 +27041,7 @@
         </p:blipFill>
         <p:spPr>
           <a:xfrm>
-            <a:off x="624315" y="1854575"/>
+            <a:off x="576449" y="2396599"/>
             <a:ext cx="3148850" cy="3148850"/>
           </a:xfrm>
           <a:prstGeom prst="rect">
@@ -26086,7 +27069,7 @@
         </p:nvSpPr>
         <p:spPr>
           <a:xfrm>
-            <a:off x="624315" y="5225209"/>
+            <a:off x="228848" y="869602"/>
             <a:ext cx="2700336" cy="456774"/>
           </a:xfrm>
           <a:prstGeom prst="rect">
@@ -26302,8 +27285,8 @@
         </p:nvSpPr>
         <p:spPr>
           <a:xfrm>
-            <a:off x="624315" y="5584617"/>
-            <a:ext cx="5720170" cy="456774"/>
+            <a:off x="228848" y="1241169"/>
+            <a:ext cx="3643141" cy="456774"/>
           </a:xfrm>
           <a:prstGeom prst="rect">
             <a:avLst/>
@@ -26506,6 +27489,271 @@
               <a:latin typeface="Times New Roman" panose="02020603050405020304" pitchFamily="18" charset="0"/>
               <a:cs typeface="Times New Roman" panose="02020603050405020304" pitchFamily="18" charset="0"/>
             </a:endParaRPr>
+          </a:p>
+        </p:txBody>
+      </p:sp>
+      <p:sp>
+        <p:nvSpPr>
+          <p:cNvPr id="8" name="Flèche : angle droit 7">
+            <a:extLst>
+              <a:ext uri="{FF2B5EF4-FFF2-40B4-BE49-F238E27FC236}">
+                <a16:creationId xmlns:a16="http://schemas.microsoft.com/office/drawing/2014/main" id="{A7F29E58-54EF-B98D-1AB5-534644622F10}"/>
+              </a:ext>
+            </a:extLst>
+          </p:cNvPr>
+          <p:cNvSpPr/>
+          <p:nvPr/>
+        </p:nvSpPr>
+        <p:spPr>
+          <a:xfrm rot="5400000">
+            <a:off x="5048088" y="5648036"/>
+            <a:ext cx="497305" cy="421599"/>
+          </a:xfrm>
+          <a:prstGeom prst="bentUpArrow">
+            <a:avLst/>
+          </a:prstGeom>
+          <a:solidFill>
+            <a:schemeClr val="tx1"/>
+          </a:solidFill>
+        </p:spPr>
+        <p:style>
+          <a:lnRef idx="2">
+            <a:schemeClr val="accent1">
+              <a:shade val="15000"/>
+            </a:schemeClr>
+          </a:lnRef>
+          <a:fillRef idx="1">
+            <a:schemeClr val="accent1"/>
+          </a:fillRef>
+          <a:effectRef idx="0">
+            <a:schemeClr val="accent1"/>
+          </a:effectRef>
+          <a:fontRef idx="minor">
+            <a:schemeClr val="lt1"/>
+          </a:fontRef>
+        </p:style>
+        <p:txBody>
+          <a:bodyPr rtlCol="0" anchor="ctr"/>
+          <a:lstStyle/>
+          <a:p>
+            <a:pPr algn="ctr"/>
+            <a:endParaRPr lang="fr-FR" dirty="0">
+              <a:solidFill>
+                <a:schemeClr val="tx1"/>
+              </a:solidFill>
+              <a:highlight>
+                <a:srgbClr val="000000"/>
+              </a:highlight>
+            </a:endParaRPr>
+          </a:p>
+        </p:txBody>
+      </p:sp>
+      <p:sp>
+        <p:nvSpPr>
+          <p:cNvPr id="9" name="Espace réservé du contenu 6">
+            <a:extLst>
+              <a:ext uri="{FF2B5EF4-FFF2-40B4-BE49-F238E27FC236}">
+                <a16:creationId xmlns:a16="http://schemas.microsoft.com/office/drawing/2014/main" id="{AC5D918C-8767-FF64-C8BE-433A7EF113F8}"/>
+              </a:ext>
+            </a:extLst>
+          </p:cNvPr>
+          <p:cNvSpPr txBox="1">
+            <a:spLocks/>
+          </p:cNvSpPr>
+          <p:nvPr>
+            <p:custDataLst>
+              <p:tags r:id="rId11"/>
+            </p:custDataLst>
+          </p:nvPr>
+        </p:nvSpPr>
+        <p:spPr>
+          <a:xfrm>
+            <a:off x="5680417" y="5568983"/>
+            <a:ext cx="3643141" cy="456774"/>
+          </a:xfrm>
+          <a:prstGeom prst="rect">
+            <a:avLst/>
+          </a:prstGeom>
+        </p:spPr>
+        <p:txBody>
+          <a:bodyPr vert="horz" lIns="91440" tIns="45720" rIns="91440" bIns="45720" rtlCol="0" anchor="t">
+            <a:noAutofit/>
+          </a:bodyPr>
+          <a:lstStyle>
+            <a:lvl1pPr marL="228600" indent="-228600" algn="l" defTabSz="914400" rtl="0" eaLnBrk="1" latinLnBrk="0" hangingPunct="1">
+              <a:lnSpc>
+                <a:spcPct val="90000"/>
+              </a:lnSpc>
+              <a:spcBef>
+                <a:spcPts val="1000"/>
+              </a:spcBef>
+              <a:buFont typeface="Arial" panose="020B0604020202020204" pitchFamily="34" charset="0"/>
+              <a:buChar char="•"/>
+              <a:defRPr sz="2800" kern="1200">
+                <a:solidFill>
+                  <a:schemeClr val="tx1"/>
+                </a:solidFill>
+                <a:latin typeface="+mn-lt"/>
+                <a:ea typeface="+mn-ea"/>
+                <a:cs typeface="+mn-cs"/>
+              </a:defRPr>
+            </a:lvl1pPr>
+            <a:lvl2pPr marL="685800" indent="-228600" algn="l" defTabSz="914400" rtl="0" eaLnBrk="1" latinLnBrk="0" hangingPunct="1">
+              <a:lnSpc>
+                <a:spcPct val="90000"/>
+              </a:lnSpc>
+              <a:spcBef>
+                <a:spcPts val="500"/>
+              </a:spcBef>
+              <a:buFont typeface="Arial" panose="020B0604020202020204" pitchFamily="34" charset="0"/>
+              <a:buChar char="•"/>
+              <a:defRPr sz="2400" kern="1200">
+                <a:solidFill>
+                  <a:schemeClr val="tx1"/>
+                </a:solidFill>
+                <a:latin typeface="+mn-lt"/>
+                <a:ea typeface="+mn-ea"/>
+                <a:cs typeface="+mn-cs"/>
+              </a:defRPr>
+            </a:lvl2pPr>
+            <a:lvl3pPr marL="1143000" indent="-228600" algn="l" defTabSz="914400" rtl="0" eaLnBrk="1" latinLnBrk="0" hangingPunct="1">
+              <a:lnSpc>
+                <a:spcPct val="90000"/>
+              </a:lnSpc>
+              <a:spcBef>
+                <a:spcPts val="500"/>
+              </a:spcBef>
+              <a:buFont typeface="Arial" panose="020B0604020202020204" pitchFamily="34" charset="0"/>
+              <a:buChar char="•"/>
+              <a:defRPr sz="2000" kern="1200">
+                <a:solidFill>
+                  <a:schemeClr val="tx1"/>
+                </a:solidFill>
+                <a:latin typeface="+mn-lt"/>
+                <a:ea typeface="+mn-ea"/>
+                <a:cs typeface="+mn-cs"/>
+              </a:defRPr>
+            </a:lvl3pPr>
+            <a:lvl4pPr marL="1600200" indent="-228600" algn="l" defTabSz="914400" rtl="0" eaLnBrk="1" latinLnBrk="0" hangingPunct="1">
+              <a:lnSpc>
+                <a:spcPct val="90000"/>
+              </a:lnSpc>
+              <a:spcBef>
+                <a:spcPts val="500"/>
+              </a:spcBef>
+              <a:buFont typeface="Arial" panose="020B0604020202020204" pitchFamily="34" charset="0"/>
+              <a:buChar char="•"/>
+              <a:defRPr sz="1800" kern="1200">
+                <a:solidFill>
+                  <a:schemeClr val="tx1"/>
+                </a:solidFill>
+                <a:latin typeface="+mn-lt"/>
+                <a:ea typeface="+mn-ea"/>
+                <a:cs typeface="+mn-cs"/>
+              </a:defRPr>
+            </a:lvl4pPr>
+            <a:lvl5pPr marL="2057400" indent="-228600" algn="l" defTabSz="914400" rtl="0" eaLnBrk="1" latinLnBrk="0" hangingPunct="1">
+              <a:lnSpc>
+                <a:spcPct val="90000"/>
+              </a:lnSpc>
+              <a:spcBef>
+                <a:spcPts val="500"/>
+              </a:spcBef>
+              <a:buFont typeface="Arial" panose="020B0604020202020204" pitchFamily="34" charset="0"/>
+              <a:buChar char="•"/>
+              <a:defRPr sz="1800" kern="1200">
+                <a:solidFill>
+                  <a:schemeClr val="tx1"/>
+                </a:solidFill>
+                <a:latin typeface="+mn-lt"/>
+                <a:ea typeface="+mn-ea"/>
+                <a:cs typeface="+mn-cs"/>
+              </a:defRPr>
+            </a:lvl5pPr>
+            <a:lvl6pPr marL="2514600" indent="-228600" algn="l" defTabSz="914400" rtl="0" eaLnBrk="1" latinLnBrk="0" hangingPunct="1">
+              <a:lnSpc>
+                <a:spcPct val="90000"/>
+              </a:lnSpc>
+              <a:spcBef>
+                <a:spcPts val="500"/>
+              </a:spcBef>
+              <a:buFont typeface="Arial" panose="020B0604020202020204" pitchFamily="34" charset="0"/>
+              <a:buChar char="•"/>
+              <a:defRPr sz="1800" kern="1200">
+                <a:solidFill>
+                  <a:schemeClr val="tx1"/>
+                </a:solidFill>
+                <a:latin typeface="+mn-lt"/>
+                <a:ea typeface="+mn-ea"/>
+                <a:cs typeface="+mn-cs"/>
+              </a:defRPr>
+            </a:lvl6pPr>
+            <a:lvl7pPr marL="2971800" indent="-228600" algn="l" defTabSz="914400" rtl="0" eaLnBrk="1" latinLnBrk="0" hangingPunct="1">
+              <a:lnSpc>
+                <a:spcPct val="90000"/>
+              </a:lnSpc>
+              <a:spcBef>
+                <a:spcPts val="500"/>
+              </a:spcBef>
+              <a:buFont typeface="Arial" panose="020B0604020202020204" pitchFamily="34" charset="0"/>
+              <a:buChar char="•"/>
+              <a:defRPr sz="1800" kern="1200">
+                <a:solidFill>
+                  <a:schemeClr val="tx1"/>
+                </a:solidFill>
+                <a:latin typeface="+mn-lt"/>
+                <a:ea typeface="+mn-ea"/>
+                <a:cs typeface="+mn-cs"/>
+              </a:defRPr>
+            </a:lvl7pPr>
+            <a:lvl8pPr marL="3429000" indent="-228600" algn="l" defTabSz="914400" rtl="0" eaLnBrk="1" latinLnBrk="0" hangingPunct="1">
+              <a:lnSpc>
+                <a:spcPct val="90000"/>
+              </a:lnSpc>
+              <a:spcBef>
+                <a:spcPts val="500"/>
+              </a:spcBef>
+              <a:buFont typeface="Arial" panose="020B0604020202020204" pitchFamily="34" charset="0"/>
+              <a:buChar char="•"/>
+              <a:defRPr sz="1800" kern="1200">
+                <a:solidFill>
+                  <a:schemeClr val="tx1"/>
+                </a:solidFill>
+                <a:latin typeface="+mn-lt"/>
+                <a:ea typeface="+mn-ea"/>
+                <a:cs typeface="+mn-cs"/>
+              </a:defRPr>
+            </a:lvl8pPr>
+            <a:lvl9pPr marL="3886200" indent="-228600" algn="l" defTabSz="914400" rtl="0" eaLnBrk="1" latinLnBrk="0" hangingPunct="1">
+              <a:lnSpc>
+                <a:spcPct val="90000"/>
+              </a:lnSpc>
+              <a:spcBef>
+                <a:spcPts val="500"/>
+              </a:spcBef>
+              <a:buFont typeface="Arial" panose="020B0604020202020204" pitchFamily="34" charset="0"/>
+              <a:buChar char="•"/>
+              <a:defRPr sz="1800" kern="1200">
+                <a:solidFill>
+                  <a:schemeClr val="tx1"/>
+                </a:solidFill>
+                <a:latin typeface="+mn-lt"/>
+                <a:ea typeface="+mn-ea"/>
+                <a:cs typeface="+mn-cs"/>
+              </a:defRPr>
+            </a:lvl9pPr>
+          </a:lstStyle>
+          <a:p>
+            <a:pPr marL="0" indent="0" algn="just">
+              <a:buNone/>
+            </a:pPr>
+            <a:r>
+              <a:rPr lang="fr-FR" sz="1800" dirty="0">
+                <a:latin typeface="Times New Roman" panose="02020603050405020304" pitchFamily="18" charset="0"/>
+                <a:cs typeface="Times New Roman" panose="02020603050405020304" pitchFamily="18" charset="0"/>
+              </a:rPr>
+              <a:t>Lola souhaite discuter avec des jeunes comme elle ayant les mêmes centres d’intérêts </a:t>
+            </a:r>
           </a:p>
         </p:txBody>
       </p:sp>
@@ -28262,43 +29510,43 @@
 
 <file path=ppt/tags/tag100.xml><?xml version="1.0" encoding="utf-8"?>
 <p:tagLst xmlns:a="http://schemas.openxmlformats.org/drawingml/2006/main" xmlns:r="http://schemas.openxmlformats.org/officeDocument/2006/relationships" xmlns:p="http://schemas.openxmlformats.org/presentationml/2006/main">
-  <p:tag name="NUM" val="13"/>
+  <p:tag name="NUM" val="10"/>
 </p:tagLst>
 </file>
 
 <file path=ppt/tags/tag101.xml><?xml version="1.0" encoding="utf-8"?>
 <p:tagLst xmlns:a="http://schemas.openxmlformats.org/drawingml/2006/main" xmlns:r="http://schemas.openxmlformats.org/officeDocument/2006/relationships" xmlns:p="http://schemas.openxmlformats.org/presentationml/2006/main">
-  <p:tag name="NUM" val="3"/>
+  <p:tag name="NUM" val="11"/>
 </p:tagLst>
 </file>
 
 <file path=ppt/tags/tag102.xml><?xml version="1.0" encoding="utf-8"?>
 <p:tagLst xmlns:a="http://schemas.openxmlformats.org/drawingml/2006/main" xmlns:r="http://schemas.openxmlformats.org/officeDocument/2006/relationships" xmlns:p="http://schemas.openxmlformats.org/presentationml/2006/main">
-  <p:tag name="NUM" val="5"/>
+  <p:tag name="NUM" val="12"/>
 </p:tagLst>
 </file>
 
 <file path=ppt/tags/tag103.xml><?xml version="1.0" encoding="utf-8"?>
 <p:tagLst xmlns:a="http://schemas.openxmlformats.org/drawingml/2006/main" xmlns:r="http://schemas.openxmlformats.org/officeDocument/2006/relationships" xmlns:p="http://schemas.openxmlformats.org/presentationml/2006/main">
-  <p:tag name="NUM" val="1"/>
+  <p:tag name="NUM" val="13"/>
 </p:tagLst>
 </file>
 
 <file path=ppt/tags/tag104.xml><?xml version="1.0" encoding="utf-8"?>
 <p:tagLst xmlns:a="http://schemas.openxmlformats.org/drawingml/2006/main" xmlns:r="http://schemas.openxmlformats.org/officeDocument/2006/relationships" xmlns:p="http://schemas.openxmlformats.org/presentationml/2006/main">
-  <p:tag name="NUM" val="2"/>
+  <p:tag name="NUM" val="13"/>
 </p:tagLst>
 </file>
 
 <file path=ppt/tags/tag105.xml><?xml version="1.0" encoding="utf-8"?>
 <p:tagLst xmlns:a="http://schemas.openxmlformats.org/drawingml/2006/main" xmlns:r="http://schemas.openxmlformats.org/officeDocument/2006/relationships" xmlns:p="http://schemas.openxmlformats.org/presentationml/2006/main">
-  <p:tag name="NUM" val="3"/>
+  <p:tag name="NUM" val="13"/>
 </p:tagLst>
 </file>
 
 <file path=ppt/tags/tag106.xml><?xml version="1.0" encoding="utf-8"?>
 <p:tagLst xmlns:a="http://schemas.openxmlformats.org/drawingml/2006/main" xmlns:r="http://schemas.openxmlformats.org/officeDocument/2006/relationships" xmlns:p="http://schemas.openxmlformats.org/presentationml/2006/main">
-  <p:tag name="NUM" val="4"/>
+  <p:tag name="NUM" val="3"/>
 </p:tagLst>
 </file>
 
@@ -28310,13 +29558,13 @@
 
 <file path=ppt/tags/tag108.xml><?xml version="1.0" encoding="utf-8"?>
 <p:tagLst xmlns:a="http://schemas.openxmlformats.org/drawingml/2006/main" xmlns:r="http://schemas.openxmlformats.org/officeDocument/2006/relationships" xmlns:p="http://schemas.openxmlformats.org/presentationml/2006/main">
-  <p:tag name="NUM" val="4"/>
+  <p:tag name="NUM" val="1"/>
 </p:tagLst>
 </file>
 
 <file path=ppt/tags/tag109.xml><?xml version="1.0" encoding="utf-8"?>
 <p:tagLst xmlns:a="http://schemas.openxmlformats.org/drawingml/2006/main" xmlns:r="http://schemas.openxmlformats.org/officeDocument/2006/relationships" xmlns:p="http://schemas.openxmlformats.org/presentationml/2006/main">
-  <p:tag name="NUM" val="1"/>
+  <p:tag name="NUM" val="2"/>
 </p:tagLst>
 </file>
 
@@ -28328,61 +29576,61 @@
 
 <file path=ppt/tags/tag110.xml><?xml version="1.0" encoding="utf-8"?>
 <p:tagLst xmlns:a="http://schemas.openxmlformats.org/drawingml/2006/main" xmlns:r="http://schemas.openxmlformats.org/officeDocument/2006/relationships" xmlns:p="http://schemas.openxmlformats.org/presentationml/2006/main">
-  <p:tag name="NUM" val="2"/>
+  <p:tag name="NUM" val="3"/>
 </p:tagLst>
 </file>
 
 <file path=ppt/tags/tag111.xml><?xml version="1.0" encoding="utf-8"?>
 <p:tagLst xmlns:a="http://schemas.openxmlformats.org/drawingml/2006/main" xmlns:r="http://schemas.openxmlformats.org/officeDocument/2006/relationships" xmlns:p="http://schemas.openxmlformats.org/presentationml/2006/main">
-  <p:tag name="NUM" val="3"/>
+  <p:tag name="NUM" val="4"/>
 </p:tagLst>
 </file>
 
 <file path=ppt/tags/tag112.xml><?xml version="1.0" encoding="utf-8"?>
 <p:tagLst xmlns:a="http://schemas.openxmlformats.org/drawingml/2006/main" xmlns:r="http://schemas.openxmlformats.org/officeDocument/2006/relationships" xmlns:p="http://schemas.openxmlformats.org/presentationml/2006/main">
-  <p:tag name="NUM" val="4"/>
+  <p:tag name="NUM" val="5"/>
 </p:tagLst>
 </file>
 
 <file path=ppt/tags/tag113.xml><?xml version="1.0" encoding="utf-8"?>
 <p:tagLst xmlns:a="http://schemas.openxmlformats.org/drawingml/2006/main" xmlns:r="http://schemas.openxmlformats.org/officeDocument/2006/relationships" xmlns:p="http://schemas.openxmlformats.org/presentationml/2006/main">
-  <p:tag name="NUM" val="5"/>
+  <p:tag name="NUM" val="1"/>
 </p:tagLst>
 </file>
 
 <file path=ppt/tags/tag114.xml><?xml version="1.0" encoding="utf-8"?>
 <p:tagLst xmlns:a="http://schemas.openxmlformats.org/drawingml/2006/main" xmlns:r="http://schemas.openxmlformats.org/officeDocument/2006/relationships" xmlns:p="http://schemas.openxmlformats.org/presentationml/2006/main">
-  <p:tag name="NUM" val="1"/>
+  <p:tag name="NUM" val="2"/>
 </p:tagLst>
 </file>
 
 <file path=ppt/tags/tag115.xml><?xml version="1.0" encoding="utf-8"?>
 <p:tagLst xmlns:a="http://schemas.openxmlformats.org/drawingml/2006/main" xmlns:r="http://schemas.openxmlformats.org/officeDocument/2006/relationships" xmlns:p="http://schemas.openxmlformats.org/presentationml/2006/main">
-  <p:tag name="NUM" val="2"/>
+  <p:tag name="NUM" val="3"/>
 </p:tagLst>
 </file>
 
 <file path=ppt/tags/tag116.xml><?xml version="1.0" encoding="utf-8"?>
 <p:tagLst xmlns:a="http://schemas.openxmlformats.org/drawingml/2006/main" xmlns:r="http://schemas.openxmlformats.org/officeDocument/2006/relationships" xmlns:p="http://schemas.openxmlformats.org/presentationml/2006/main">
-  <p:tag name="NUM" val="3"/>
+  <p:tag name="NUM" val="4"/>
 </p:tagLst>
 </file>
 
 <file path=ppt/tags/tag117.xml><?xml version="1.0" encoding="utf-8"?>
 <p:tagLst xmlns:a="http://schemas.openxmlformats.org/drawingml/2006/main" xmlns:r="http://schemas.openxmlformats.org/officeDocument/2006/relationships" xmlns:p="http://schemas.openxmlformats.org/presentationml/2006/main">
-  <p:tag name="NUM" val="4"/>
+  <p:tag name="NUM" val="5"/>
 </p:tagLst>
 </file>
 
 <file path=ppt/tags/tag118.xml><?xml version="1.0" encoding="utf-8"?>
 <p:tagLst xmlns:a="http://schemas.openxmlformats.org/drawingml/2006/main" xmlns:r="http://schemas.openxmlformats.org/officeDocument/2006/relationships" xmlns:p="http://schemas.openxmlformats.org/presentationml/2006/main">
-  <p:tag name="NUM" val="5"/>
+  <p:tag name="NUM" val="1"/>
 </p:tagLst>
 </file>
 
 <file path=ppt/tags/tag119.xml><?xml version="1.0" encoding="utf-8"?>
 <p:tagLst xmlns:a="http://schemas.openxmlformats.org/drawingml/2006/main" xmlns:r="http://schemas.openxmlformats.org/officeDocument/2006/relationships" xmlns:p="http://schemas.openxmlformats.org/presentationml/2006/main">
-  <p:tag name="NUM" val="1"/>
+  <p:tag name="NUM" val="2"/>
 </p:tagLst>
 </file>
 
@@ -28394,61 +29642,61 @@
 
 <file path=ppt/tags/tag120.xml><?xml version="1.0" encoding="utf-8"?>
 <p:tagLst xmlns:a="http://schemas.openxmlformats.org/drawingml/2006/main" xmlns:r="http://schemas.openxmlformats.org/officeDocument/2006/relationships" xmlns:p="http://schemas.openxmlformats.org/presentationml/2006/main">
-  <p:tag name="NUM" val="2"/>
+  <p:tag name="NUM" val="3"/>
 </p:tagLst>
 </file>
 
 <file path=ppt/tags/tag121.xml><?xml version="1.0" encoding="utf-8"?>
 <p:tagLst xmlns:a="http://schemas.openxmlformats.org/drawingml/2006/main" xmlns:r="http://schemas.openxmlformats.org/officeDocument/2006/relationships" xmlns:p="http://schemas.openxmlformats.org/presentationml/2006/main">
-  <p:tag name="NUM" val="3"/>
+  <p:tag name="NUM" val="4"/>
 </p:tagLst>
 </file>
 
 <file path=ppt/tags/tag122.xml><?xml version="1.0" encoding="utf-8"?>
 <p:tagLst xmlns:a="http://schemas.openxmlformats.org/drawingml/2006/main" xmlns:r="http://schemas.openxmlformats.org/officeDocument/2006/relationships" xmlns:p="http://schemas.openxmlformats.org/presentationml/2006/main">
-  <p:tag name="NUM" val="4"/>
+  <p:tag name="NUM" val="5"/>
 </p:tagLst>
 </file>
 
 <file path=ppt/tags/tag123.xml><?xml version="1.0" encoding="utf-8"?>
 <p:tagLst xmlns:a="http://schemas.openxmlformats.org/drawingml/2006/main" xmlns:r="http://schemas.openxmlformats.org/officeDocument/2006/relationships" xmlns:p="http://schemas.openxmlformats.org/presentationml/2006/main">
-  <p:tag name="NUM" val="5"/>
+  <p:tag name="NUM" val="1"/>
 </p:tagLst>
 </file>
 
 <file path=ppt/tags/tag124.xml><?xml version="1.0" encoding="utf-8"?>
 <p:tagLst xmlns:a="http://schemas.openxmlformats.org/drawingml/2006/main" xmlns:r="http://schemas.openxmlformats.org/officeDocument/2006/relationships" xmlns:p="http://schemas.openxmlformats.org/presentationml/2006/main">
-  <p:tag name="NUM" val="6"/>
+  <p:tag name="NUM" val="2"/>
 </p:tagLst>
 </file>
 
 <file path=ppt/tags/tag125.xml><?xml version="1.0" encoding="utf-8"?>
 <p:tagLst xmlns:a="http://schemas.openxmlformats.org/drawingml/2006/main" xmlns:r="http://schemas.openxmlformats.org/officeDocument/2006/relationships" xmlns:p="http://schemas.openxmlformats.org/presentationml/2006/main">
-  <p:tag name="NUM" val="7"/>
+  <p:tag name="NUM" val="3"/>
 </p:tagLst>
 </file>
 
 <file path=ppt/tags/tag126.xml><?xml version="1.0" encoding="utf-8"?>
 <p:tagLst xmlns:a="http://schemas.openxmlformats.org/drawingml/2006/main" xmlns:r="http://schemas.openxmlformats.org/officeDocument/2006/relationships" xmlns:p="http://schemas.openxmlformats.org/presentationml/2006/main">
-  <p:tag name="NUM" val="8"/>
+  <p:tag name="NUM" val="4"/>
 </p:tagLst>
 </file>
 
 <file path=ppt/tags/tag127.xml><?xml version="1.0" encoding="utf-8"?>
 <p:tagLst xmlns:a="http://schemas.openxmlformats.org/drawingml/2006/main" xmlns:r="http://schemas.openxmlformats.org/officeDocument/2006/relationships" xmlns:p="http://schemas.openxmlformats.org/presentationml/2006/main">
-  <p:tag name="NUM" val="9"/>
+  <p:tag name="NUM" val="6"/>
 </p:tagLst>
 </file>
 
 <file path=ppt/tags/tag128.xml><?xml version="1.0" encoding="utf-8"?>
 <p:tagLst xmlns:a="http://schemas.openxmlformats.org/drawingml/2006/main" xmlns:r="http://schemas.openxmlformats.org/officeDocument/2006/relationships" xmlns:p="http://schemas.openxmlformats.org/presentationml/2006/main">
-  <p:tag name="NUM" val="10"/>
+  <p:tag name="NUM" val="7"/>
 </p:tagLst>
 </file>
 
 <file path=ppt/tags/tag129.xml><?xml version="1.0" encoding="utf-8"?>
 <p:tagLst xmlns:a="http://schemas.openxmlformats.org/drawingml/2006/main" xmlns:r="http://schemas.openxmlformats.org/officeDocument/2006/relationships" xmlns:p="http://schemas.openxmlformats.org/presentationml/2006/main">
-  <p:tag name="NUM" val="11"/>
+  <p:tag name="NUM" val="8"/>
 </p:tagLst>
 </file>
 
@@ -28460,37 +29708,37 @@
 
 <file path=ppt/tags/tag130.xml><?xml version="1.0" encoding="utf-8"?>
 <p:tagLst xmlns:a="http://schemas.openxmlformats.org/drawingml/2006/main" xmlns:r="http://schemas.openxmlformats.org/officeDocument/2006/relationships" xmlns:p="http://schemas.openxmlformats.org/presentationml/2006/main">
-  <p:tag name="NUM" val="1"/>
+  <p:tag name="NUM" val="9"/>
 </p:tagLst>
 </file>
 
 <file path=ppt/tags/tag131.xml><?xml version="1.0" encoding="utf-8"?>
 <p:tagLst xmlns:a="http://schemas.openxmlformats.org/drawingml/2006/main" xmlns:r="http://schemas.openxmlformats.org/officeDocument/2006/relationships" xmlns:p="http://schemas.openxmlformats.org/presentationml/2006/main">
-  <p:tag name="NUM" val="2"/>
+  <p:tag name="NUM" val="10"/>
 </p:tagLst>
 </file>
 
 <file path=ppt/tags/tag132.xml><?xml version="1.0" encoding="utf-8"?>
 <p:tagLst xmlns:a="http://schemas.openxmlformats.org/drawingml/2006/main" xmlns:r="http://schemas.openxmlformats.org/officeDocument/2006/relationships" xmlns:p="http://schemas.openxmlformats.org/presentationml/2006/main">
-  <p:tag name="NUM" val="3"/>
+  <p:tag name="NUM" val="11"/>
 </p:tagLst>
 </file>
 
 <file path=ppt/tags/tag133.xml><?xml version="1.0" encoding="utf-8"?>
 <p:tagLst xmlns:a="http://schemas.openxmlformats.org/drawingml/2006/main" xmlns:r="http://schemas.openxmlformats.org/officeDocument/2006/relationships" xmlns:p="http://schemas.openxmlformats.org/presentationml/2006/main">
-  <p:tag name="NUM" val="4"/>
+  <p:tag name="NUM" val="1"/>
 </p:tagLst>
 </file>
 
 <file path=ppt/tags/tag134.xml><?xml version="1.0" encoding="utf-8"?>
 <p:tagLst xmlns:a="http://schemas.openxmlformats.org/drawingml/2006/main" xmlns:r="http://schemas.openxmlformats.org/officeDocument/2006/relationships" xmlns:p="http://schemas.openxmlformats.org/presentationml/2006/main">
-  <p:tag name="NUM" val="5"/>
+  <p:tag name="NUM" val="2"/>
 </p:tagLst>
 </file>
 
 <file path=ppt/tags/tag135.xml><?xml version="1.0" encoding="utf-8"?>
 <p:tagLst xmlns:a="http://schemas.openxmlformats.org/drawingml/2006/main" xmlns:r="http://schemas.openxmlformats.org/officeDocument/2006/relationships" xmlns:p="http://schemas.openxmlformats.org/presentationml/2006/main">
-  <p:tag name="NUM" val="5"/>
+  <p:tag name="NUM" val="3"/>
 </p:tagLst>
 </file>
 
@@ -28502,7 +29750,7 @@
 
 <file path=ppt/tags/tag137.xml><?xml version="1.0" encoding="utf-8"?>
 <p:tagLst xmlns:a="http://schemas.openxmlformats.org/drawingml/2006/main" xmlns:r="http://schemas.openxmlformats.org/officeDocument/2006/relationships" xmlns:p="http://schemas.openxmlformats.org/presentationml/2006/main">
-  <p:tag name="NUM" val="3"/>
+  <p:tag name="NUM" val="5"/>
 </p:tagLst>
 </file>
 
@@ -28514,7 +29762,7 @@
 
 <file path=ppt/tags/tag139.xml><?xml version="1.0" encoding="utf-8"?>
 <p:tagLst xmlns:a="http://schemas.openxmlformats.org/drawingml/2006/main" xmlns:r="http://schemas.openxmlformats.org/officeDocument/2006/relationships" xmlns:p="http://schemas.openxmlformats.org/presentationml/2006/main">
-  <p:tag name="NUM" val="1"/>
+  <p:tag name="NUM" val="4"/>
 </p:tagLst>
 </file>
 
@@ -28526,37 +29774,37 @@
 
 <file path=ppt/tags/tag140.xml><?xml version="1.0" encoding="utf-8"?>
 <p:tagLst xmlns:a="http://schemas.openxmlformats.org/drawingml/2006/main" xmlns:r="http://schemas.openxmlformats.org/officeDocument/2006/relationships" xmlns:p="http://schemas.openxmlformats.org/presentationml/2006/main">
-  <p:tag name="NUM" val="2"/>
+  <p:tag name="NUM" val="3"/>
 </p:tagLst>
 </file>
 
 <file path=ppt/tags/tag141.xml><?xml version="1.0" encoding="utf-8"?>
 <p:tagLst xmlns:a="http://schemas.openxmlformats.org/drawingml/2006/main" xmlns:r="http://schemas.openxmlformats.org/officeDocument/2006/relationships" xmlns:p="http://schemas.openxmlformats.org/presentationml/2006/main">
-  <p:tag name="NUM" val="3"/>
+  <p:tag name="NUM" val="5"/>
 </p:tagLst>
 </file>
 
 <file path=ppt/tags/tag142.xml><?xml version="1.0" encoding="utf-8"?>
 <p:tagLst xmlns:a="http://schemas.openxmlformats.org/drawingml/2006/main" xmlns:r="http://schemas.openxmlformats.org/officeDocument/2006/relationships" xmlns:p="http://schemas.openxmlformats.org/presentationml/2006/main">
-  <p:tag name="NUM" val="4"/>
+  <p:tag name="NUM" val="1"/>
 </p:tagLst>
 </file>
 
 <file path=ppt/tags/tag143.xml><?xml version="1.0" encoding="utf-8"?>
 <p:tagLst xmlns:a="http://schemas.openxmlformats.org/drawingml/2006/main" xmlns:r="http://schemas.openxmlformats.org/officeDocument/2006/relationships" xmlns:p="http://schemas.openxmlformats.org/presentationml/2006/main">
-  <p:tag name="NUM" val="5"/>
+  <p:tag name="NUM" val="2"/>
 </p:tagLst>
 </file>
 
 <file path=ppt/tags/tag144.xml><?xml version="1.0" encoding="utf-8"?>
 <p:tagLst xmlns:a="http://schemas.openxmlformats.org/drawingml/2006/main" xmlns:r="http://schemas.openxmlformats.org/officeDocument/2006/relationships" xmlns:p="http://schemas.openxmlformats.org/presentationml/2006/main">
-  <p:tag name="NUM" val="6"/>
+  <p:tag name="NUM" val="3"/>
 </p:tagLst>
 </file>
 
 <file path=ppt/tags/tag145.xml><?xml version="1.0" encoding="utf-8"?>
 <p:tagLst xmlns:a="http://schemas.openxmlformats.org/drawingml/2006/main" xmlns:r="http://schemas.openxmlformats.org/officeDocument/2006/relationships" xmlns:p="http://schemas.openxmlformats.org/presentationml/2006/main">
-  <p:tag name="NUM" val="7"/>
+  <p:tag name="NUM" val="4"/>
 </p:tagLst>
 </file>
 
@@ -28568,19 +29816,19 @@
 
 <file path=ppt/tags/tag147.xml><?xml version="1.0" encoding="utf-8"?>
 <p:tagLst xmlns:a="http://schemas.openxmlformats.org/drawingml/2006/main" xmlns:r="http://schemas.openxmlformats.org/officeDocument/2006/relationships" xmlns:p="http://schemas.openxmlformats.org/presentationml/2006/main">
-  <p:tag name="NUM" val="5"/>
+  <p:tag name="NUM" val="6"/>
 </p:tagLst>
 </file>
 
 <file path=ppt/tags/tag148.xml><?xml version="1.0" encoding="utf-8"?>
 <p:tagLst xmlns:a="http://schemas.openxmlformats.org/drawingml/2006/main" xmlns:r="http://schemas.openxmlformats.org/officeDocument/2006/relationships" xmlns:p="http://schemas.openxmlformats.org/presentationml/2006/main">
-  <p:tag name="NUM" val="1"/>
+  <p:tag name="NUM" val="7"/>
 </p:tagLst>
 </file>
 
 <file path=ppt/tags/tag149.xml><?xml version="1.0" encoding="utf-8"?>
 <p:tagLst xmlns:a="http://schemas.openxmlformats.org/drawingml/2006/main" xmlns:r="http://schemas.openxmlformats.org/officeDocument/2006/relationships" xmlns:p="http://schemas.openxmlformats.org/presentationml/2006/main">
-  <p:tag name="NUM" val="2"/>
+  <p:tag name="NUM" val="5"/>
 </p:tagLst>
 </file>
 
@@ -28592,35 +29840,47 @@
 
 <file path=ppt/tags/tag150.xml><?xml version="1.0" encoding="utf-8"?>
 <p:tagLst xmlns:a="http://schemas.openxmlformats.org/drawingml/2006/main" xmlns:r="http://schemas.openxmlformats.org/officeDocument/2006/relationships" xmlns:p="http://schemas.openxmlformats.org/presentationml/2006/main">
-  <p:tag name="NUM" val="3"/>
+  <p:tag name="NUM" val="5"/>
 </p:tagLst>
 </file>
 
 <file path=ppt/tags/tag151.xml><?xml version="1.0" encoding="utf-8"?>
 <p:tagLst xmlns:a="http://schemas.openxmlformats.org/drawingml/2006/main" xmlns:r="http://schemas.openxmlformats.org/officeDocument/2006/relationships" xmlns:p="http://schemas.openxmlformats.org/presentationml/2006/main">
-  <p:tag name="NUM" val="4"/>
+  <p:tag name="NUM" val="1"/>
 </p:tagLst>
 </file>
 
 <file path=ppt/tags/tag152.xml><?xml version="1.0" encoding="utf-8"?>
 <p:tagLst xmlns:a="http://schemas.openxmlformats.org/drawingml/2006/main" xmlns:r="http://schemas.openxmlformats.org/officeDocument/2006/relationships" xmlns:p="http://schemas.openxmlformats.org/presentationml/2006/main">
-  <p:tag name="NUM" val="5"/>
+  <p:tag name="NUM" val="2"/>
 </p:tagLst>
 </file>
 
 <file path=ppt/tags/tag153.xml><?xml version="1.0" encoding="utf-8"?>
 <p:tagLst xmlns:a="http://schemas.openxmlformats.org/drawingml/2006/main" xmlns:r="http://schemas.openxmlformats.org/officeDocument/2006/relationships" xmlns:p="http://schemas.openxmlformats.org/presentationml/2006/main">
-  <p:tag name="NUM" val="6"/>
+  <p:tag name="NUM" val="3"/>
 </p:tagLst>
 </file>
 
 <file path=ppt/tags/tag154.xml><?xml version="1.0" encoding="utf-8"?>
 <p:tagLst xmlns:a="http://schemas.openxmlformats.org/drawingml/2006/main" xmlns:r="http://schemas.openxmlformats.org/officeDocument/2006/relationships" xmlns:p="http://schemas.openxmlformats.org/presentationml/2006/main">
+  <p:tag name="NUM" val="4"/>
+</p:tagLst>
+</file>
+
+<file path=ppt/tags/tag155.xml><?xml version="1.0" encoding="utf-8"?>
+<p:tagLst xmlns:a="http://schemas.openxmlformats.org/drawingml/2006/main" xmlns:r="http://schemas.openxmlformats.org/officeDocument/2006/relationships" xmlns:p="http://schemas.openxmlformats.org/presentationml/2006/main">
   <p:tag name="NUM" val="5"/>
 </p:tagLst>
 </file>
 
-<file path=ppt/tags/tag155.xml><?xml version="1.0" encoding="utf-8"?>
+<file path=ppt/tags/tag156.xml><?xml version="1.0" encoding="utf-8"?>
+<p:tagLst xmlns:a="http://schemas.openxmlformats.org/drawingml/2006/main" xmlns:r="http://schemas.openxmlformats.org/officeDocument/2006/relationships" xmlns:p="http://schemas.openxmlformats.org/presentationml/2006/main">
+  <p:tag name="NUM" val="5"/>
+</p:tagLst>
+</file>
+
+<file path=ppt/tags/tag157.xml><?xml version="1.0" encoding="utf-8"?>
 <p:tagLst xmlns:a="http://schemas.openxmlformats.org/drawingml/2006/main" xmlns:r="http://schemas.openxmlformats.org/officeDocument/2006/relationships" xmlns:p="http://schemas.openxmlformats.org/presentationml/2006/main">
   <p:tag name="NUM" val="4"/>
 </p:tagLst>
@@ -28790,49 +30050,49 @@
 
 <file path=ppt/tags/tag40.xml><?xml version="1.0" encoding="utf-8"?>
 <p:tagLst xmlns:a="http://schemas.openxmlformats.org/drawingml/2006/main" xmlns:r="http://schemas.openxmlformats.org/officeDocument/2006/relationships" xmlns:p="http://schemas.openxmlformats.org/presentationml/2006/main">
-  <p:tag name="NUM" val="1"/>
+  <p:tag name="NUM" val="6"/>
 </p:tagLst>
 </file>
 
 <file path=ppt/tags/tag41.xml><?xml version="1.0" encoding="utf-8"?>
 <p:tagLst xmlns:a="http://schemas.openxmlformats.org/drawingml/2006/main" xmlns:r="http://schemas.openxmlformats.org/officeDocument/2006/relationships" xmlns:p="http://schemas.openxmlformats.org/presentationml/2006/main">
-  <p:tag name="NUM" val="2"/>
+  <p:tag name="NUM" val="1"/>
 </p:tagLst>
 </file>
 
 <file path=ppt/tags/tag42.xml><?xml version="1.0" encoding="utf-8"?>
 <p:tagLst xmlns:a="http://schemas.openxmlformats.org/drawingml/2006/main" xmlns:r="http://schemas.openxmlformats.org/officeDocument/2006/relationships" xmlns:p="http://schemas.openxmlformats.org/presentationml/2006/main">
-  <p:tag name="NUM" val="3"/>
+  <p:tag name="NUM" val="2"/>
 </p:tagLst>
 </file>
 
 <file path=ppt/tags/tag43.xml><?xml version="1.0" encoding="utf-8"?>
 <p:tagLst xmlns:a="http://schemas.openxmlformats.org/drawingml/2006/main" xmlns:r="http://schemas.openxmlformats.org/officeDocument/2006/relationships" xmlns:p="http://schemas.openxmlformats.org/presentationml/2006/main">
-  <p:tag name="NUM" val="4"/>
+  <p:tag name="NUM" val="3"/>
 </p:tagLst>
 </file>
 
 <file path=ppt/tags/tag44.xml><?xml version="1.0" encoding="utf-8"?>
 <p:tagLst xmlns:a="http://schemas.openxmlformats.org/drawingml/2006/main" xmlns:r="http://schemas.openxmlformats.org/officeDocument/2006/relationships" xmlns:p="http://schemas.openxmlformats.org/presentationml/2006/main">
-  <p:tag name="NUM" val="5"/>
+  <p:tag name="NUM" val="4"/>
 </p:tagLst>
 </file>
 
 <file path=ppt/tags/tag45.xml><?xml version="1.0" encoding="utf-8"?>
 <p:tagLst xmlns:a="http://schemas.openxmlformats.org/drawingml/2006/main" xmlns:r="http://schemas.openxmlformats.org/officeDocument/2006/relationships" xmlns:p="http://schemas.openxmlformats.org/presentationml/2006/main">
-  <p:tag name="NUM" val="6"/>
+  <p:tag name="NUM" val="5"/>
 </p:tagLst>
 </file>
 
 <file path=ppt/tags/tag46.xml><?xml version="1.0" encoding="utf-8"?>
 <p:tagLst xmlns:a="http://schemas.openxmlformats.org/drawingml/2006/main" xmlns:r="http://schemas.openxmlformats.org/officeDocument/2006/relationships" xmlns:p="http://schemas.openxmlformats.org/presentationml/2006/main">
-  <p:tag name="NUM" val="7"/>
+  <p:tag name="NUM" val="6"/>
 </p:tagLst>
 </file>
 
 <file path=ppt/tags/tag47.xml><?xml version="1.0" encoding="utf-8"?>
 <p:tagLst xmlns:a="http://schemas.openxmlformats.org/drawingml/2006/main" xmlns:r="http://schemas.openxmlformats.org/officeDocument/2006/relationships" xmlns:p="http://schemas.openxmlformats.org/presentationml/2006/main">
-  <p:tag name="NUM" val="6"/>
+  <p:tag name="NUM" val="7"/>
 </p:tagLst>
 </file>
 
@@ -28844,7 +30104,7 @@
 
 <file path=ppt/tags/tag49.xml><?xml version="1.0" encoding="utf-8"?>
 <p:tagLst xmlns:a="http://schemas.openxmlformats.org/drawingml/2006/main" xmlns:r="http://schemas.openxmlformats.org/officeDocument/2006/relationships" xmlns:p="http://schemas.openxmlformats.org/presentationml/2006/main">
-  <p:tag name="NUM" val="1"/>
+  <p:tag name="NUM" val="6"/>
 </p:tagLst>
 </file>
 
@@ -28856,61 +30116,61 @@
 
 <file path=ppt/tags/tag50.xml><?xml version="1.0" encoding="utf-8"?>
 <p:tagLst xmlns:a="http://schemas.openxmlformats.org/drawingml/2006/main" xmlns:r="http://schemas.openxmlformats.org/officeDocument/2006/relationships" xmlns:p="http://schemas.openxmlformats.org/presentationml/2006/main">
-  <p:tag name="NUM" val="2"/>
+  <p:tag name="NUM" val="6"/>
 </p:tagLst>
 </file>
 
 <file path=ppt/tags/tag51.xml><?xml version="1.0" encoding="utf-8"?>
 <p:tagLst xmlns:a="http://schemas.openxmlformats.org/drawingml/2006/main" xmlns:r="http://schemas.openxmlformats.org/officeDocument/2006/relationships" xmlns:p="http://schemas.openxmlformats.org/presentationml/2006/main">
-  <p:tag name="NUM" val="3"/>
+  <p:tag name="NUM" val="1"/>
 </p:tagLst>
 </file>
 
 <file path=ppt/tags/tag52.xml><?xml version="1.0" encoding="utf-8"?>
 <p:tagLst xmlns:a="http://schemas.openxmlformats.org/drawingml/2006/main" xmlns:r="http://schemas.openxmlformats.org/officeDocument/2006/relationships" xmlns:p="http://schemas.openxmlformats.org/presentationml/2006/main">
-  <p:tag name="NUM" val="4"/>
+  <p:tag name="NUM" val="2"/>
 </p:tagLst>
 </file>
 
 <file path=ppt/tags/tag53.xml><?xml version="1.0" encoding="utf-8"?>
 <p:tagLst xmlns:a="http://schemas.openxmlformats.org/drawingml/2006/main" xmlns:r="http://schemas.openxmlformats.org/officeDocument/2006/relationships" xmlns:p="http://schemas.openxmlformats.org/presentationml/2006/main">
-  <p:tag name="NUM" val="5"/>
+  <p:tag name="NUM" val="3"/>
 </p:tagLst>
 </file>
 
 <file path=ppt/tags/tag54.xml><?xml version="1.0" encoding="utf-8"?>
 <p:tagLst xmlns:a="http://schemas.openxmlformats.org/drawingml/2006/main" xmlns:r="http://schemas.openxmlformats.org/officeDocument/2006/relationships" xmlns:p="http://schemas.openxmlformats.org/presentationml/2006/main">
-  <p:tag name="NUM" val="6"/>
+  <p:tag name="NUM" val="4"/>
 </p:tagLst>
 </file>
 
 <file path=ppt/tags/tag55.xml><?xml version="1.0" encoding="utf-8"?>
 <p:tagLst xmlns:a="http://schemas.openxmlformats.org/drawingml/2006/main" xmlns:r="http://schemas.openxmlformats.org/officeDocument/2006/relationships" xmlns:p="http://schemas.openxmlformats.org/presentationml/2006/main">
-  <p:tag name="NUM" val="7"/>
+  <p:tag name="NUM" val="5"/>
 </p:tagLst>
 </file>
 
 <file path=ppt/tags/tag56.xml><?xml version="1.0" encoding="utf-8"?>
 <p:tagLst xmlns:a="http://schemas.openxmlformats.org/drawingml/2006/main" xmlns:r="http://schemas.openxmlformats.org/officeDocument/2006/relationships" xmlns:p="http://schemas.openxmlformats.org/presentationml/2006/main">
-  <p:tag name="NUM" val="8"/>
+  <p:tag name="NUM" val="6"/>
 </p:tagLst>
 </file>
 
 <file path=ppt/tags/tag57.xml><?xml version="1.0" encoding="utf-8"?>
 <p:tagLst xmlns:a="http://schemas.openxmlformats.org/drawingml/2006/main" xmlns:r="http://schemas.openxmlformats.org/officeDocument/2006/relationships" xmlns:p="http://schemas.openxmlformats.org/presentationml/2006/main">
-  <p:tag name="NUM" val="6"/>
+  <p:tag name="NUM" val="7"/>
 </p:tagLst>
 </file>
 
 <file path=ppt/tags/tag58.xml><?xml version="1.0" encoding="utf-8"?>
 <p:tagLst xmlns:a="http://schemas.openxmlformats.org/drawingml/2006/main" xmlns:r="http://schemas.openxmlformats.org/officeDocument/2006/relationships" xmlns:p="http://schemas.openxmlformats.org/presentationml/2006/main">
-  <p:tag name="NUM" val="6"/>
+  <p:tag name="NUM" val="8"/>
 </p:tagLst>
 </file>
 
 <file path=ppt/tags/tag59.xml><?xml version="1.0" encoding="utf-8"?>
 <p:tagLst xmlns:a="http://schemas.openxmlformats.org/drawingml/2006/main" xmlns:r="http://schemas.openxmlformats.org/officeDocument/2006/relationships" xmlns:p="http://schemas.openxmlformats.org/presentationml/2006/main">
-  <p:tag name="NUM" val="1"/>
+  <p:tag name="NUM" val="6"/>
 </p:tagLst>
 </file>
 
@@ -28922,61 +30182,61 @@
 
 <file path=ppt/tags/tag60.xml><?xml version="1.0" encoding="utf-8"?>
 <p:tagLst xmlns:a="http://schemas.openxmlformats.org/drawingml/2006/main" xmlns:r="http://schemas.openxmlformats.org/officeDocument/2006/relationships" xmlns:p="http://schemas.openxmlformats.org/presentationml/2006/main">
-  <p:tag name="NUM" val="2"/>
+  <p:tag name="NUM" val="6"/>
 </p:tagLst>
 </file>
 
 <file path=ppt/tags/tag61.xml><?xml version="1.0" encoding="utf-8"?>
 <p:tagLst xmlns:a="http://schemas.openxmlformats.org/drawingml/2006/main" xmlns:r="http://schemas.openxmlformats.org/officeDocument/2006/relationships" xmlns:p="http://schemas.openxmlformats.org/presentationml/2006/main">
-  <p:tag name="NUM" val="3"/>
+  <p:tag name="NUM" val="6"/>
 </p:tagLst>
 </file>
 
 <file path=ppt/tags/tag62.xml><?xml version="1.0" encoding="utf-8"?>
 <p:tagLst xmlns:a="http://schemas.openxmlformats.org/drawingml/2006/main" xmlns:r="http://schemas.openxmlformats.org/officeDocument/2006/relationships" xmlns:p="http://schemas.openxmlformats.org/presentationml/2006/main">
-  <p:tag name="NUM" val="4"/>
+  <p:tag name="NUM" val="1"/>
 </p:tagLst>
 </file>
 
 <file path=ppt/tags/tag63.xml><?xml version="1.0" encoding="utf-8"?>
 <p:tagLst xmlns:a="http://schemas.openxmlformats.org/drawingml/2006/main" xmlns:r="http://schemas.openxmlformats.org/officeDocument/2006/relationships" xmlns:p="http://schemas.openxmlformats.org/presentationml/2006/main">
-  <p:tag name="NUM" val="5"/>
+  <p:tag name="NUM" val="2"/>
 </p:tagLst>
 </file>
 
 <file path=ppt/tags/tag64.xml><?xml version="1.0" encoding="utf-8"?>
 <p:tagLst xmlns:a="http://schemas.openxmlformats.org/drawingml/2006/main" xmlns:r="http://schemas.openxmlformats.org/officeDocument/2006/relationships" xmlns:p="http://schemas.openxmlformats.org/presentationml/2006/main">
-  <p:tag name="NUM" val="6"/>
+  <p:tag name="NUM" val="3"/>
 </p:tagLst>
 </file>
 
 <file path=ppt/tags/tag65.xml><?xml version="1.0" encoding="utf-8"?>
 <p:tagLst xmlns:a="http://schemas.openxmlformats.org/drawingml/2006/main" xmlns:r="http://schemas.openxmlformats.org/officeDocument/2006/relationships" xmlns:p="http://schemas.openxmlformats.org/presentationml/2006/main">
-  <p:tag name="NUM" val="7"/>
+  <p:tag name="NUM" val="4"/>
 </p:tagLst>
 </file>
 
 <file path=ppt/tags/tag66.xml><?xml version="1.0" encoding="utf-8"?>
 <p:tagLst xmlns:a="http://schemas.openxmlformats.org/drawingml/2006/main" xmlns:r="http://schemas.openxmlformats.org/officeDocument/2006/relationships" xmlns:p="http://schemas.openxmlformats.org/presentationml/2006/main">
-  <p:tag name="NUM" val="8"/>
+  <p:tag name="NUM" val="5"/>
 </p:tagLst>
 </file>
 
 <file path=ppt/tags/tag67.xml><?xml version="1.0" encoding="utf-8"?>
 <p:tagLst xmlns:a="http://schemas.openxmlformats.org/drawingml/2006/main" xmlns:r="http://schemas.openxmlformats.org/officeDocument/2006/relationships" xmlns:p="http://schemas.openxmlformats.org/presentationml/2006/main">
-  <p:tag name="NUM" val="5"/>
+  <p:tag name="NUM" val="6"/>
 </p:tagLst>
 </file>
 
 <file path=ppt/tags/tag68.xml><?xml version="1.0" encoding="utf-8"?>
 <p:tagLst xmlns:a="http://schemas.openxmlformats.org/drawingml/2006/main" xmlns:r="http://schemas.openxmlformats.org/officeDocument/2006/relationships" xmlns:p="http://schemas.openxmlformats.org/presentationml/2006/main">
-  <p:tag name="NUM" val="1"/>
+  <p:tag name="NUM" val="7"/>
 </p:tagLst>
 </file>
 
 <file path=ppt/tags/tag69.xml><?xml version="1.0" encoding="utf-8"?>
 <p:tagLst xmlns:a="http://schemas.openxmlformats.org/drawingml/2006/main" xmlns:r="http://schemas.openxmlformats.org/officeDocument/2006/relationships" xmlns:p="http://schemas.openxmlformats.org/presentationml/2006/main">
-  <p:tag name="NUM" val="2"/>
+  <p:tag name="NUM" val="8"/>
 </p:tagLst>
 </file>
 
@@ -28988,61 +30248,61 @@
 
 <file path=ppt/tags/tag70.xml><?xml version="1.0" encoding="utf-8"?>
 <p:tagLst xmlns:a="http://schemas.openxmlformats.org/drawingml/2006/main" xmlns:r="http://schemas.openxmlformats.org/officeDocument/2006/relationships" xmlns:p="http://schemas.openxmlformats.org/presentationml/2006/main">
-  <p:tag name="NUM" val="3"/>
+  <p:tag name="NUM" val="5"/>
 </p:tagLst>
 </file>
 
 <file path=ppt/tags/tag71.xml><?xml version="1.0" encoding="utf-8"?>
 <p:tagLst xmlns:a="http://schemas.openxmlformats.org/drawingml/2006/main" xmlns:r="http://schemas.openxmlformats.org/officeDocument/2006/relationships" xmlns:p="http://schemas.openxmlformats.org/presentationml/2006/main">
-  <p:tag name="NUM" val="4"/>
+  <p:tag name="NUM" val="1"/>
 </p:tagLst>
 </file>
 
 <file path=ppt/tags/tag72.xml><?xml version="1.0" encoding="utf-8"?>
 <p:tagLst xmlns:a="http://schemas.openxmlformats.org/drawingml/2006/main" xmlns:r="http://schemas.openxmlformats.org/officeDocument/2006/relationships" xmlns:p="http://schemas.openxmlformats.org/presentationml/2006/main">
-  <p:tag name="NUM" val="5"/>
+  <p:tag name="NUM" val="2"/>
 </p:tagLst>
 </file>
 
 <file path=ppt/tags/tag73.xml><?xml version="1.0" encoding="utf-8"?>
 <p:tagLst xmlns:a="http://schemas.openxmlformats.org/drawingml/2006/main" xmlns:r="http://schemas.openxmlformats.org/officeDocument/2006/relationships" xmlns:p="http://schemas.openxmlformats.org/presentationml/2006/main">
-  <p:tag name="NUM" val="6"/>
+  <p:tag name="NUM" val="3"/>
 </p:tagLst>
 </file>
 
 <file path=ppt/tags/tag74.xml><?xml version="1.0" encoding="utf-8"?>
 <p:tagLst xmlns:a="http://schemas.openxmlformats.org/drawingml/2006/main" xmlns:r="http://schemas.openxmlformats.org/officeDocument/2006/relationships" xmlns:p="http://schemas.openxmlformats.org/presentationml/2006/main">
-  <p:tag name="NUM" val="7"/>
+  <p:tag name="NUM" val="4"/>
 </p:tagLst>
 </file>
 
 <file path=ppt/tags/tag75.xml><?xml version="1.0" encoding="utf-8"?>
 <p:tagLst xmlns:a="http://schemas.openxmlformats.org/drawingml/2006/main" xmlns:r="http://schemas.openxmlformats.org/officeDocument/2006/relationships" xmlns:p="http://schemas.openxmlformats.org/presentationml/2006/main">
-  <p:tag name="NUM" val="8"/>
+  <p:tag name="NUM" val="5"/>
 </p:tagLst>
 </file>
 
 <file path=ppt/tags/tag76.xml><?xml version="1.0" encoding="utf-8"?>
 <p:tagLst xmlns:a="http://schemas.openxmlformats.org/drawingml/2006/main" xmlns:r="http://schemas.openxmlformats.org/officeDocument/2006/relationships" xmlns:p="http://schemas.openxmlformats.org/presentationml/2006/main">
-  <p:tag name="NUM" val="1"/>
+  <p:tag name="NUM" val="6"/>
 </p:tagLst>
 </file>
 
 <file path=ppt/tags/tag77.xml><?xml version="1.0" encoding="utf-8"?>
 <p:tagLst xmlns:a="http://schemas.openxmlformats.org/drawingml/2006/main" xmlns:r="http://schemas.openxmlformats.org/officeDocument/2006/relationships" xmlns:p="http://schemas.openxmlformats.org/presentationml/2006/main">
-  <p:tag name="NUM" val="2"/>
+  <p:tag name="NUM" val="7"/>
 </p:tagLst>
 </file>
 
 <file path=ppt/tags/tag78.xml><?xml version="1.0" encoding="utf-8"?>
 <p:tagLst xmlns:a="http://schemas.openxmlformats.org/drawingml/2006/main" xmlns:r="http://schemas.openxmlformats.org/officeDocument/2006/relationships" xmlns:p="http://schemas.openxmlformats.org/presentationml/2006/main">
-  <p:tag name="NUM" val="3"/>
+  <p:tag name="NUM" val="8"/>
 </p:tagLst>
 </file>
 
 <file path=ppt/tags/tag79.xml><?xml version="1.0" encoding="utf-8"?>
 <p:tagLst xmlns:a="http://schemas.openxmlformats.org/drawingml/2006/main" xmlns:r="http://schemas.openxmlformats.org/officeDocument/2006/relationships" xmlns:p="http://schemas.openxmlformats.org/presentationml/2006/main">
-  <p:tag name="NUM" val="4"/>
+  <p:tag name="NUM" val="1"/>
 </p:tagLst>
 </file>
 
@@ -29054,61 +30314,61 @@
 
 <file path=ppt/tags/tag80.xml><?xml version="1.0" encoding="utf-8"?>
 <p:tagLst xmlns:a="http://schemas.openxmlformats.org/drawingml/2006/main" xmlns:r="http://schemas.openxmlformats.org/officeDocument/2006/relationships" xmlns:p="http://schemas.openxmlformats.org/presentationml/2006/main">
-  <p:tag name="NUM" val="5"/>
+  <p:tag name="NUM" val="2"/>
 </p:tagLst>
 </file>
 
 <file path=ppt/tags/tag81.xml><?xml version="1.0" encoding="utf-8"?>
 <p:tagLst xmlns:a="http://schemas.openxmlformats.org/drawingml/2006/main" xmlns:r="http://schemas.openxmlformats.org/officeDocument/2006/relationships" xmlns:p="http://schemas.openxmlformats.org/presentationml/2006/main">
-  <p:tag name="NUM" val="6"/>
+  <p:tag name="NUM" val="3"/>
 </p:tagLst>
 </file>
 
 <file path=ppt/tags/tag82.xml><?xml version="1.0" encoding="utf-8"?>
 <p:tagLst xmlns:a="http://schemas.openxmlformats.org/drawingml/2006/main" xmlns:r="http://schemas.openxmlformats.org/officeDocument/2006/relationships" xmlns:p="http://schemas.openxmlformats.org/presentationml/2006/main">
-  <p:tag name="NUM" val="7"/>
+  <p:tag name="NUM" val="4"/>
 </p:tagLst>
 </file>
 
 <file path=ppt/tags/tag83.xml><?xml version="1.0" encoding="utf-8"?>
 <p:tagLst xmlns:a="http://schemas.openxmlformats.org/drawingml/2006/main" xmlns:r="http://schemas.openxmlformats.org/officeDocument/2006/relationships" xmlns:p="http://schemas.openxmlformats.org/presentationml/2006/main">
-  <p:tag name="NUM" val="8"/>
+  <p:tag name="NUM" val="5"/>
 </p:tagLst>
 </file>
 
 <file path=ppt/tags/tag84.xml><?xml version="1.0" encoding="utf-8"?>
 <p:tagLst xmlns:a="http://schemas.openxmlformats.org/drawingml/2006/main" xmlns:r="http://schemas.openxmlformats.org/officeDocument/2006/relationships" xmlns:p="http://schemas.openxmlformats.org/presentationml/2006/main">
-  <p:tag name="NUM" val="9"/>
+  <p:tag name="NUM" val="6"/>
 </p:tagLst>
 </file>
 
 <file path=ppt/tags/tag85.xml><?xml version="1.0" encoding="utf-8"?>
 <p:tagLst xmlns:a="http://schemas.openxmlformats.org/drawingml/2006/main" xmlns:r="http://schemas.openxmlformats.org/officeDocument/2006/relationships" xmlns:p="http://schemas.openxmlformats.org/presentationml/2006/main">
-  <p:tag name="NUM" val="10"/>
+  <p:tag name="NUM" val="7"/>
 </p:tagLst>
 </file>
 
 <file path=ppt/tags/tag86.xml><?xml version="1.0" encoding="utf-8"?>
 <p:tagLst xmlns:a="http://schemas.openxmlformats.org/drawingml/2006/main" xmlns:r="http://schemas.openxmlformats.org/officeDocument/2006/relationships" xmlns:p="http://schemas.openxmlformats.org/presentationml/2006/main">
-  <p:tag name="NUM" val="1"/>
+  <p:tag name="NUM" val="8"/>
 </p:tagLst>
 </file>
 
 <file path=ppt/tags/tag87.xml><?xml version="1.0" encoding="utf-8"?>
 <p:tagLst xmlns:a="http://schemas.openxmlformats.org/drawingml/2006/main" xmlns:r="http://schemas.openxmlformats.org/officeDocument/2006/relationships" xmlns:p="http://schemas.openxmlformats.org/presentationml/2006/main">
-  <p:tag name="NUM" val="2"/>
+  <p:tag name="NUM" val="9"/>
 </p:tagLst>
 </file>
 
 <file path=ppt/tags/tag88.xml><?xml version="1.0" encoding="utf-8"?>
 <p:tagLst xmlns:a="http://schemas.openxmlformats.org/drawingml/2006/main" xmlns:r="http://schemas.openxmlformats.org/officeDocument/2006/relationships" xmlns:p="http://schemas.openxmlformats.org/presentationml/2006/main">
-  <p:tag name="NUM" val="3"/>
+  <p:tag name="NUM" val="10"/>
 </p:tagLst>
 </file>
 
 <file path=ppt/tags/tag89.xml><?xml version="1.0" encoding="utf-8"?>
 <p:tagLst xmlns:a="http://schemas.openxmlformats.org/drawingml/2006/main" xmlns:r="http://schemas.openxmlformats.org/officeDocument/2006/relationships" xmlns:p="http://schemas.openxmlformats.org/presentationml/2006/main">
-  <p:tag name="NUM" val="4"/>
+  <p:tag name="NUM" val="6"/>
 </p:tagLst>
 </file>
 
@@ -29120,61 +30380,61 @@
 
 <file path=ppt/tags/tag90.xml><?xml version="1.0" encoding="utf-8"?>
 <p:tagLst xmlns:a="http://schemas.openxmlformats.org/drawingml/2006/main" xmlns:r="http://schemas.openxmlformats.org/officeDocument/2006/relationships" xmlns:p="http://schemas.openxmlformats.org/presentationml/2006/main">
-  <p:tag name="NUM" val="5"/>
+  <p:tag name="NUM" val="8"/>
 </p:tagLst>
 </file>
 
 <file path=ppt/tags/tag91.xml><?xml version="1.0" encoding="utf-8"?>
 <p:tagLst xmlns:a="http://schemas.openxmlformats.org/drawingml/2006/main" xmlns:r="http://schemas.openxmlformats.org/officeDocument/2006/relationships" xmlns:p="http://schemas.openxmlformats.org/presentationml/2006/main">
-  <p:tag name="NUM" val="6"/>
+  <p:tag name="NUM" val="1"/>
 </p:tagLst>
 </file>
 
 <file path=ppt/tags/tag92.xml><?xml version="1.0" encoding="utf-8"?>
 <p:tagLst xmlns:a="http://schemas.openxmlformats.org/drawingml/2006/main" xmlns:r="http://schemas.openxmlformats.org/officeDocument/2006/relationships" xmlns:p="http://schemas.openxmlformats.org/presentationml/2006/main">
-  <p:tag name="NUM" val="7"/>
+  <p:tag name="NUM" val="2"/>
 </p:tagLst>
 </file>
 
 <file path=ppt/tags/tag93.xml><?xml version="1.0" encoding="utf-8"?>
 <p:tagLst xmlns:a="http://schemas.openxmlformats.org/drawingml/2006/main" xmlns:r="http://schemas.openxmlformats.org/officeDocument/2006/relationships" xmlns:p="http://schemas.openxmlformats.org/presentationml/2006/main">
-  <p:tag name="NUM" val="8"/>
+  <p:tag name="NUM" val="3"/>
 </p:tagLst>
 </file>
 
 <file path=ppt/tags/tag94.xml><?xml version="1.0" encoding="utf-8"?>
 <p:tagLst xmlns:a="http://schemas.openxmlformats.org/drawingml/2006/main" xmlns:r="http://schemas.openxmlformats.org/officeDocument/2006/relationships" xmlns:p="http://schemas.openxmlformats.org/presentationml/2006/main">
-  <p:tag name="NUM" val="9"/>
+  <p:tag name="NUM" val="4"/>
 </p:tagLst>
 </file>
 
 <file path=ppt/tags/tag95.xml><?xml version="1.0" encoding="utf-8"?>
 <p:tagLst xmlns:a="http://schemas.openxmlformats.org/drawingml/2006/main" xmlns:r="http://schemas.openxmlformats.org/officeDocument/2006/relationships" xmlns:p="http://schemas.openxmlformats.org/presentationml/2006/main">
-  <p:tag name="NUM" val="10"/>
+  <p:tag name="NUM" val="5"/>
 </p:tagLst>
 </file>
 
 <file path=ppt/tags/tag96.xml><?xml version="1.0" encoding="utf-8"?>
 <p:tagLst xmlns:a="http://schemas.openxmlformats.org/drawingml/2006/main" xmlns:r="http://schemas.openxmlformats.org/officeDocument/2006/relationships" xmlns:p="http://schemas.openxmlformats.org/presentationml/2006/main">
-  <p:tag name="NUM" val="11"/>
+  <p:tag name="NUM" val="6"/>
 </p:tagLst>
 </file>
 
 <file path=ppt/tags/tag97.xml><?xml version="1.0" encoding="utf-8"?>
 <p:tagLst xmlns:a="http://schemas.openxmlformats.org/drawingml/2006/main" xmlns:r="http://schemas.openxmlformats.org/officeDocument/2006/relationships" xmlns:p="http://schemas.openxmlformats.org/presentationml/2006/main">
-  <p:tag name="NUM" val="12"/>
+  <p:tag name="NUM" val="7"/>
 </p:tagLst>
 </file>
 
 <file path=ppt/tags/tag98.xml><?xml version="1.0" encoding="utf-8"?>
 <p:tagLst xmlns:a="http://schemas.openxmlformats.org/drawingml/2006/main" xmlns:r="http://schemas.openxmlformats.org/officeDocument/2006/relationships" xmlns:p="http://schemas.openxmlformats.org/presentationml/2006/main">
-  <p:tag name="NUM" val="13"/>
+  <p:tag name="NUM" val="8"/>
 </p:tagLst>
 </file>
 
 <file path=ppt/tags/tag99.xml><?xml version="1.0" encoding="utf-8"?>
 <p:tagLst xmlns:a="http://schemas.openxmlformats.org/drawingml/2006/main" xmlns:r="http://schemas.openxmlformats.org/officeDocument/2006/relationships" xmlns:p="http://schemas.openxmlformats.org/presentationml/2006/main">
-  <p:tag name="NUM" val="13"/>
+  <p:tag name="NUM" val="9"/>
 </p:tagLst>
 </file>
 

</xml_diff>